<commit_message>
Update presentation to the one shown in the hackathon
</commit_message>
<xml_diff>
--- a/media/Hack.pptx
+++ b/media/Hack.pptx
@@ -5,14 +5,21 @@
     <p:sldMasterId id="2147483660" r:id="rId1"/>
   </p:sldMasterIdLst>
   <p:notesMasterIdLst>
-    <p:notesMasterId r:id="rId7"/>
+    <p:notesMasterId r:id="rId14"/>
   </p:notesMasterIdLst>
   <p:sldIdLst>
     <p:sldId id="260" r:id="rId2"/>
     <p:sldId id="257" r:id="rId3"/>
     <p:sldId id="258" r:id="rId4"/>
-    <p:sldId id="259" r:id="rId5"/>
-    <p:sldId id="261" r:id="rId6"/>
+    <p:sldId id="262" r:id="rId5"/>
+    <p:sldId id="263" r:id="rId6"/>
+    <p:sldId id="269" r:id="rId7"/>
+    <p:sldId id="266" r:id="rId8"/>
+    <p:sldId id="264" r:id="rId9"/>
+    <p:sldId id="270" r:id="rId10"/>
+    <p:sldId id="261" r:id="rId11"/>
+    <p:sldId id="267" r:id="rId12"/>
+    <p:sldId id="268" r:id="rId13"/>
   </p:sldIdLst>
   <p:sldSz cx="12192000" cy="6858000"/>
   <p:notesSz cx="6858000" cy="9144000"/>
@@ -111,6 +118,22 @@
       </a:defRPr>
     </a:lvl9pPr>
   </p:defaultTextStyle>
+  <p:extLst>
+    <p:ext uri="{EFAFB233-063F-42B5-8137-9DF3F51BA10A}">
+      <p15:sldGuideLst xmlns:p15="http://schemas.microsoft.com/office/powerpoint/2012/main" xmlns="">
+        <p15:guide id="1" orient="horz" pos="2160">
+          <p15:clr>
+            <a:srgbClr val="A4A3A4"/>
+          </p15:clr>
+        </p15:guide>
+        <p15:guide id="2" pos="3840">
+          <p15:clr>
+            <a:srgbClr val="A4A3A4"/>
+          </p15:clr>
+        </p15:guide>
+      </p15:sldGuideLst>
+    </p:ext>
+  </p:extLst>
 </p:presentation>
 </file>
 
@@ -196,7 +219,7 @@
           <a:p>
             <a:fld id="{DD0C4AC4-6857-46B6-A73D-3D32E8EDB03F}" type="datetimeFigureOut">
               <a:rPr lang="en-US" smtClean="0"/>
-              <a:t>9/22/2016</a:t>
+              <a:t>9/23/2016</a:t>
             </a:fld>
             <a:endParaRPr lang="en-US"/>
           </a:p>
@@ -291,7 +314,6 @@
               <a:rPr lang="en-US"/>
               <a:t>Fifth level</a:t>
             </a:r>
-            <a:endParaRPr lang="en-US"/>
           </a:p>
         </p:txBody>
       </p:sp>
@@ -709,7 +731,7 @@
           <a:p>
             <a:fld id="{0C74E4DF-CD41-4E36-AC78-846563C3E9FF}" type="datetimeFigureOut">
               <a:rPr lang="en-US" smtClean="0"/>
-              <a:t>9/22/2016</a:t>
+              <a:t>9/23/2016</a:t>
             </a:fld>
             <a:endParaRPr lang="en-US"/>
           </a:p>
@@ -920,7 +942,7 @@
           <a:p>
             <a:fld id="{0C74E4DF-CD41-4E36-AC78-846563C3E9FF}" type="datetimeFigureOut">
               <a:rPr lang="en-US" smtClean="0"/>
-              <a:t>9/22/2016</a:t>
+              <a:t>9/23/2016</a:t>
             </a:fld>
             <a:endParaRPr lang="en-US"/>
           </a:p>
@@ -1135,7 +1157,7 @@
           <a:p>
             <a:fld id="{0C74E4DF-CD41-4E36-AC78-846563C3E9FF}" type="datetimeFigureOut">
               <a:rPr lang="en-US" smtClean="0"/>
-              <a:t>9/22/2016</a:t>
+              <a:t>9/23/2016</a:t>
             </a:fld>
             <a:endParaRPr lang="en-US"/>
           </a:p>
@@ -1336,7 +1358,7 @@
           <a:p>
             <a:fld id="{0C74E4DF-CD41-4E36-AC78-846563C3E9FF}" type="datetimeFigureOut">
               <a:rPr lang="en-US" smtClean="0"/>
-              <a:t>9/22/2016</a:t>
+              <a:t>9/23/2016</a:t>
             </a:fld>
             <a:endParaRPr lang="en-US"/>
           </a:p>
@@ -1635,7 +1657,7 @@
           <a:p>
             <a:fld id="{0C74E4DF-CD41-4E36-AC78-846563C3E9FF}" type="datetimeFigureOut">
               <a:rPr lang="en-US" smtClean="0"/>
-              <a:t>9/22/2016</a:t>
+              <a:t>9/23/2016</a:t>
             </a:fld>
             <a:endParaRPr lang="en-US"/>
           </a:p>
@@ -1903,7 +1925,7 @@
           <a:p>
             <a:fld id="{0C74E4DF-CD41-4E36-AC78-846563C3E9FF}" type="datetimeFigureOut">
               <a:rPr lang="en-US" smtClean="0"/>
-              <a:t>9/22/2016</a:t>
+              <a:t>9/23/2016</a:t>
             </a:fld>
             <a:endParaRPr lang="en-US"/>
           </a:p>
@@ -2319,7 +2341,7 @@
           <a:p>
             <a:fld id="{0C74E4DF-CD41-4E36-AC78-846563C3E9FF}" type="datetimeFigureOut">
               <a:rPr lang="en-US" smtClean="0"/>
-              <a:t>9/22/2016</a:t>
+              <a:t>9/23/2016</a:t>
             </a:fld>
             <a:endParaRPr lang="en-US"/>
           </a:p>
@@ -2468,7 +2490,7 @@
           <a:p>
             <a:fld id="{0C74E4DF-CD41-4E36-AC78-846563C3E9FF}" type="datetimeFigureOut">
               <a:rPr lang="en-US" smtClean="0"/>
-              <a:t>9/22/2016</a:t>
+              <a:t>9/23/2016</a:t>
             </a:fld>
             <a:endParaRPr lang="en-US"/>
           </a:p>
@@ -2563,7 +2585,7 @@
           <a:p>
             <a:fld id="{0C74E4DF-CD41-4E36-AC78-846563C3E9FF}" type="datetimeFigureOut">
               <a:rPr lang="en-US" smtClean="0"/>
-              <a:t>9/22/2016</a:t>
+              <a:t>9/23/2016</a:t>
             </a:fld>
             <a:endParaRPr lang="en-US"/>
           </a:p>
@@ -2814,7 +2836,7 @@
           <a:p>
             <a:fld id="{0C74E4DF-CD41-4E36-AC78-846563C3E9FF}" type="datetimeFigureOut">
               <a:rPr lang="en-US" smtClean="0"/>
-              <a:t>9/22/2016</a:t>
+              <a:t>9/23/2016</a:t>
             </a:fld>
             <a:endParaRPr lang="en-US"/>
           </a:p>
@@ -3259,7 +3281,7 @@
           <a:p>
             <a:fld id="{0C74E4DF-CD41-4E36-AC78-846563C3E9FF}" type="datetimeFigureOut">
               <a:rPr lang="en-US" smtClean="0"/>
-              <a:t>9/22/2016</a:t>
+              <a:t>9/23/2016</a:t>
             </a:fld>
             <a:endParaRPr lang="en-US"/>
           </a:p>
@@ -3588,7 +3610,7 @@
           <a:p>
             <a:fld id="{0C74E4DF-CD41-4E36-AC78-846563C3E9FF}" type="datetimeFigureOut">
               <a:rPr lang="en-US" smtClean="0"/>
-              <a:t>9/22/2016</a:t>
+              <a:t>9/23/2016</a:t>
             </a:fld>
             <a:endParaRPr lang="en-US"/>
           </a:p>
@@ -4109,9 +4131,9 @@
                 <a:solidFill>
                   <a:srgbClr val="E9006B"/>
                 </a:solidFill>
-                <a:latin typeface="Oswald"/>
+                <a:latin typeface="MV Boli" panose="02000500030200090000" pitchFamily="2" charset="0"/>
                 <a:ea typeface="Oswald"/>
-                <a:cs typeface="Oswald"/>
+                <a:cs typeface="MV Boli" panose="02000500030200090000" pitchFamily="2" charset="0"/>
                 <a:sym typeface="Oswald"/>
               </a:rPr>
               <a:t>The Doorks</a:t>
@@ -4200,6 +4222,540 @@
   <p:clrMapOvr>
     <a:masterClrMapping/>
   </p:clrMapOvr>
+  <p:timing>
+    <p:tnLst>
+      <p:par>
+        <p:cTn id="1" dur="indefinite" restart="never" nodeType="tmRoot"/>
+      </p:par>
+    </p:tnLst>
+  </p:timing>
+</p:sld>
+</file>
+
+<file path=ppt/slides/slide10.xml><?xml version="1.0" encoding="utf-8"?>
+<p:sld xmlns:a="http://schemas.openxmlformats.org/drawingml/2006/main" xmlns:r="http://schemas.openxmlformats.org/officeDocument/2006/relationships" xmlns:p="http://schemas.openxmlformats.org/presentationml/2006/main">
+  <p:cSld>
+    <p:spTree>
+      <p:nvGrpSpPr>
+        <p:cNvPr id="1" name=""/>
+        <p:cNvGrpSpPr/>
+        <p:nvPr/>
+      </p:nvGrpSpPr>
+      <p:grpSpPr>
+        <a:xfrm>
+          <a:off x="0" y="0"/>
+          <a:ext cx="0" cy="0"/>
+          <a:chOff x="0" y="0"/>
+          <a:chExt cx="0" cy="0"/>
+        </a:xfrm>
+      </p:grpSpPr>
+      <p:sp>
+        <p:nvSpPr>
+          <p:cNvPr id="2" name="Title 1"/>
+          <p:cNvSpPr>
+            <a:spLocks noGrp="1"/>
+          </p:cNvSpPr>
+          <p:nvPr>
+            <p:ph type="title"/>
+          </p:nvPr>
+        </p:nvSpPr>
+        <p:spPr/>
+        <p:txBody>
+          <a:bodyPr/>
+          <a:lstStyle/>
+          <a:p>
+            <a:r>
+              <a:rPr lang="en-US" dirty="0"/>
+              <a:t>Meet the </a:t>
+            </a:r>
+            <a:r>
+              <a:rPr lang="en-US" dirty="0" err="1"/>
+              <a:t>doorks</a:t>
+            </a:r>
+            <a:endParaRPr lang="en-US" dirty="0"/>
+          </a:p>
+        </p:txBody>
+      </p:sp>
+      <p:pic>
+        <p:nvPicPr>
+          <p:cNvPr id="4" name="Content Placeholder 3"/>
+          <p:cNvPicPr>
+            <a:picLocks noGrp="1" noChangeAspect="1"/>
+          </p:cNvPicPr>
+          <p:nvPr>
+            <p:ph idx="1"/>
+          </p:nvPr>
+        </p:nvPicPr>
+        <p:blipFill>
+          <a:blip r:embed="rId2">
+            <a:extLst>
+              <a:ext uri="{28A0092B-C50C-407E-A947-70E740481C1C}">
+                <a14:useLocalDpi xmlns:a14="http://schemas.microsoft.com/office/drawing/2010/main" val="0"/>
+              </a:ext>
+            </a:extLst>
+          </a:blip>
+          <a:stretch>
+            <a:fillRect/>
+          </a:stretch>
+        </p:blipFill>
+        <p:spPr>
+          <a:xfrm>
+            <a:off x="1977778" y="1853754"/>
+            <a:ext cx="6132689" cy="3449638"/>
+          </a:xfrm>
+        </p:spPr>
+      </p:pic>
+      <p:sp>
+        <p:nvSpPr>
+          <p:cNvPr id="5" name="TextBox 4"/>
+          <p:cNvSpPr txBox="1"/>
+          <p:nvPr/>
+        </p:nvSpPr>
+        <p:spPr>
+          <a:xfrm>
+            <a:off x="3058160" y="2258193"/>
+            <a:ext cx="1513840" cy="369332"/>
+          </a:xfrm>
+          <a:prstGeom prst="rect">
+            <a:avLst/>
+          </a:prstGeom>
+          <a:noFill/>
+        </p:spPr>
+        <p:txBody>
+          <a:bodyPr wrap="square" rtlCol="0">
+            <a:spAutoFit/>
+          </a:bodyPr>
+          <a:lstStyle/>
+          <a:p>
+            <a:r>
+              <a:rPr lang="en-US" dirty="0" err="1"/>
+              <a:t>Liat</a:t>
+            </a:r>
+            <a:endParaRPr lang="en-US" dirty="0"/>
+          </a:p>
+        </p:txBody>
+      </p:sp>
+      <p:sp>
+        <p:nvSpPr>
+          <p:cNvPr id="6" name="TextBox 5"/>
+          <p:cNvSpPr txBox="1"/>
+          <p:nvPr/>
+        </p:nvSpPr>
+        <p:spPr>
+          <a:xfrm>
+            <a:off x="4206240" y="1853754"/>
+            <a:ext cx="1513840" cy="369332"/>
+          </a:xfrm>
+          <a:prstGeom prst="rect">
+            <a:avLst/>
+          </a:prstGeom>
+          <a:noFill/>
+        </p:spPr>
+        <p:txBody>
+          <a:bodyPr wrap="square" rtlCol="0">
+            <a:spAutoFit/>
+          </a:bodyPr>
+          <a:lstStyle/>
+          <a:p>
+            <a:r>
+              <a:rPr lang="en-US" dirty="0"/>
+              <a:t>Moran</a:t>
+            </a:r>
+          </a:p>
+        </p:txBody>
+      </p:sp>
+      <p:sp>
+        <p:nvSpPr>
+          <p:cNvPr id="7" name="TextBox 6"/>
+          <p:cNvSpPr txBox="1"/>
+          <p:nvPr/>
+        </p:nvSpPr>
+        <p:spPr>
+          <a:xfrm>
+            <a:off x="5862320" y="1862128"/>
+            <a:ext cx="1513840" cy="369332"/>
+          </a:xfrm>
+          <a:prstGeom prst="rect">
+            <a:avLst/>
+          </a:prstGeom>
+          <a:noFill/>
+        </p:spPr>
+        <p:txBody>
+          <a:bodyPr wrap="square" rtlCol="0">
+            <a:spAutoFit/>
+          </a:bodyPr>
+          <a:lstStyle/>
+          <a:p>
+            <a:r>
+              <a:rPr lang="en-US" dirty="0"/>
+              <a:t>Ruslan</a:t>
+            </a:r>
+          </a:p>
+        </p:txBody>
+      </p:sp>
+      <p:sp>
+        <p:nvSpPr>
+          <p:cNvPr id="8" name="TextBox 7"/>
+          <p:cNvSpPr txBox="1"/>
+          <p:nvPr/>
+        </p:nvSpPr>
+        <p:spPr>
+          <a:xfrm>
+            <a:off x="6862847" y="3672044"/>
+            <a:ext cx="1513840" cy="369332"/>
+          </a:xfrm>
+          <a:prstGeom prst="rect">
+            <a:avLst/>
+          </a:prstGeom>
+          <a:noFill/>
+        </p:spPr>
+        <p:txBody>
+          <a:bodyPr wrap="square" rtlCol="0">
+            <a:spAutoFit/>
+          </a:bodyPr>
+          <a:lstStyle/>
+          <a:p>
+            <a:r>
+              <a:rPr lang="en-US" dirty="0">
+                <a:solidFill>
+                  <a:schemeClr val="bg1"/>
+                </a:solidFill>
+              </a:rPr>
+              <a:t>Guy</a:t>
+            </a:r>
+          </a:p>
+        </p:txBody>
+      </p:sp>
+      <p:sp>
+        <p:nvSpPr>
+          <p:cNvPr id="9" name="TextBox 8"/>
+          <p:cNvSpPr txBox="1"/>
+          <p:nvPr/>
+        </p:nvSpPr>
+        <p:spPr>
+          <a:xfrm>
+            <a:off x="3921760" y="4614548"/>
+            <a:ext cx="1513840" cy="369332"/>
+          </a:xfrm>
+          <a:prstGeom prst="rect">
+            <a:avLst/>
+          </a:prstGeom>
+          <a:noFill/>
+        </p:spPr>
+        <p:txBody>
+          <a:bodyPr wrap="square" rtlCol="0">
+            <a:spAutoFit/>
+          </a:bodyPr>
+          <a:lstStyle/>
+          <a:p>
+            <a:r>
+              <a:rPr lang="en-US" dirty="0">
+                <a:solidFill>
+                  <a:schemeClr val="bg1"/>
+                </a:solidFill>
+              </a:rPr>
+              <a:t>Gal</a:t>
+            </a:r>
+          </a:p>
+        </p:txBody>
+      </p:sp>
+      <p:sp>
+        <p:nvSpPr>
+          <p:cNvPr id="10" name="TextBox 9"/>
+          <p:cNvSpPr txBox="1"/>
+          <p:nvPr/>
+        </p:nvSpPr>
+        <p:spPr>
+          <a:xfrm>
+            <a:off x="9082757" y="3210379"/>
+            <a:ext cx="3625059" cy="923330"/>
+          </a:xfrm>
+          <a:prstGeom prst="rect">
+            <a:avLst/>
+          </a:prstGeom>
+          <a:noFill/>
+        </p:spPr>
+        <p:txBody>
+          <a:bodyPr wrap="square" rtlCol="0">
+            <a:spAutoFit/>
+          </a:bodyPr>
+          <a:lstStyle/>
+          <a:p>
+            <a:r>
+              <a:rPr lang="en-US" dirty="0" smtClean="0"/>
+              <a:t>Contact :</a:t>
+            </a:r>
+          </a:p>
+          <a:p>
+            <a:r>
+              <a:rPr lang="en-US" dirty="0" smtClean="0"/>
+              <a:t>guy@shapedo.com</a:t>
+            </a:r>
+            <a:endParaRPr lang="en-US" dirty="0"/>
+          </a:p>
+          <a:p>
+            <a:r>
+              <a:rPr lang="en-US" dirty="0"/>
+              <a:t> </a:t>
+            </a:r>
+          </a:p>
+        </p:txBody>
+      </p:sp>
+    </p:spTree>
+    <p:extLst>
+      <p:ext uri="{BB962C8B-B14F-4D97-AF65-F5344CB8AC3E}">
+        <p14:creationId xmlns:p14="http://schemas.microsoft.com/office/powerpoint/2010/main" val="2906367310"/>
+      </p:ext>
+    </p:extLst>
+  </p:cSld>
+  <p:clrMapOvr>
+    <a:masterClrMapping/>
+  </p:clrMapOvr>
+  <p:timing>
+    <p:tnLst>
+      <p:par>
+        <p:cTn id="1" dur="indefinite" restart="never" nodeType="tmRoot"/>
+      </p:par>
+    </p:tnLst>
+  </p:timing>
+</p:sld>
+</file>
+
+<file path=ppt/slides/slide11.xml><?xml version="1.0" encoding="utf-8"?>
+<p:sld xmlns:a="http://schemas.openxmlformats.org/drawingml/2006/main" xmlns:r="http://schemas.openxmlformats.org/officeDocument/2006/relationships" xmlns:p="http://schemas.openxmlformats.org/presentationml/2006/main">
+  <p:cSld>
+    <p:spTree>
+      <p:nvGrpSpPr>
+        <p:cNvPr id="1" name=""/>
+        <p:cNvGrpSpPr/>
+        <p:nvPr/>
+      </p:nvGrpSpPr>
+      <p:grpSpPr>
+        <a:xfrm>
+          <a:off x="0" y="0"/>
+          <a:ext cx="0" cy="0"/>
+          <a:chOff x="0" y="0"/>
+          <a:chExt cx="0" cy="0"/>
+        </a:xfrm>
+      </p:grpSpPr>
+      <p:sp>
+        <p:nvSpPr>
+          <p:cNvPr id="2" name="Title 1"/>
+          <p:cNvSpPr>
+            <a:spLocks noGrp="1"/>
+          </p:cNvSpPr>
+          <p:nvPr>
+            <p:ph type="title"/>
+          </p:nvPr>
+        </p:nvSpPr>
+        <p:spPr/>
+        <p:txBody>
+          <a:bodyPr/>
+          <a:lstStyle/>
+          <a:p>
+            <a:r>
+              <a:rPr lang="en-US" dirty="0"/>
+              <a:t>Future work</a:t>
+            </a:r>
+            <a:endParaRPr lang="he-IL" dirty="0"/>
+          </a:p>
+        </p:txBody>
+      </p:sp>
+      <p:sp>
+        <p:nvSpPr>
+          <p:cNvPr id="3" name="Content Placeholder 2"/>
+          <p:cNvSpPr>
+            <a:spLocks noGrp="1"/>
+          </p:cNvSpPr>
+          <p:nvPr>
+            <p:ph idx="1"/>
+          </p:nvPr>
+        </p:nvSpPr>
+        <p:spPr/>
+        <p:txBody>
+          <a:bodyPr/>
+          <a:lstStyle/>
+          <a:p>
+            <a:r>
+              <a:rPr lang="en-US" dirty="0"/>
+              <a:t>Recognize more elements in floor plans</a:t>
+            </a:r>
+          </a:p>
+          <a:p>
+            <a:r>
+              <a:rPr lang="en-US" dirty="0"/>
+              <a:t>Consider edge case</a:t>
+            </a:r>
+          </a:p>
+          <a:p>
+            <a:pPr lvl="1"/>
+            <a:r>
+              <a:rPr lang="en-US" dirty="0"/>
+              <a:t>Image normalization</a:t>
+            </a:r>
+          </a:p>
+          <a:p>
+            <a:pPr lvl="1"/>
+            <a:r>
+              <a:rPr lang="en-US" dirty="0"/>
+              <a:t>Noise</a:t>
+            </a:r>
+          </a:p>
+          <a:p>
+            <a:endParaRPr lang="he-IL" dirty="0"/>
+          </a:p>
+        </p:txBody>
+      </p:sp>
+    </p:spTree>
+    <p:extLst>
+      <p:ext uri="{BB962C8B-B14F-4D97-AF65-F5344CB8AC3E}">
+        <p14:creationId xmlns:p14="http://schemas.microsoft.com/office/powerpoint/2010/main" val="623610504"/>
+      </p:ext>
+    </p:extLst>
+  </p:cSld>
+  <p:clrMapOvr>
+    <a:masterClrMapping/>
+  </p:clrMapOvr>
+  <p:timing>
+    <p:tnLst>
+      <p:par>
+        <p:cTn id="1" dur="indefinite" restart="never" nodeType="tmRoot"/>
+      </p:par>
+    </p:tnLst>
+  </p:timing>
+</p:sld>
+</file>
+
+<file path=ppt/slides/slide12.xml><?xml version="1.0" encoding="utf-8"?>
+<p:sld xmlns:a="http://schemas.openxmlformats.org/drawingml/2006/main" xmlns:r="http://schemas.openxmlformats.org/officeDocument/2006/relationships" xmlns:p="http://schemas.openxmlformats.org/presentationml/2006/main">
+  <p:cSld>
+    <p:spTree>
+      <p:nvGrpSpPr>
+        <p:cNvPr id="1" name=""/>
+        <p:cNvGrpSpPr/>
+        <p:nvPr/>
+      </p:nvGrpSpPr>
+      <p:grpSpPr>
+        <a:xfrm>
+          <a:off x="0" y="0"/>
+          <a:ext cx="0" cy="0"/>
+          <a:chOff x="0" y="0"/>
+          <a:chExt cx="0" cy="0"/>
+        </a:xfrm>
+      </p:grpSpPr>
+      <p:sp>
+        <p:nvSpPr>
+          <p:cNvPr id="2" name="Title 1"/>
+          <p:cNvSpPr>
+            <a:spLocks noGrp="1"/>
+          </p:cNvSpPr>
+          <p:nvPr>
+            <p:ph type="title"/>
+          </p:nvPr>
+        </p:nvSpPr>
+        <p:spPr/>
+        <p:txBody>
+          <a:bodyPr/>
+          <a:lstStyle/>
+          <a:p>
+            <a:r>
+              <a:rPr lang="en-US" dirty="0"/>
+              <a:t>Appendix</a:t>
+            </a:r>
+            <a:endParaRPr lang="he-IL" dirty="0"/>
+          </a:p>
+        </p:txBody>
+      </p:sp>
+      <p:sp>
+        <p:nvSpPr>
+          <p:cNvPr id="3" name="Content Placeholder 2"/>
+          <p:cNvSpPr>
+            <a:spLocks noGrp="1"/>
+          </p:cNvSpPr>
+          <p:nvPr>
+            <p:ph idx="1"/>
+          </p:nvPr>
+        </p:nvSpPr>
+        <p:spPr/>
+        <p:txBody>
+          <a:bodyPr/>
+          <a:lstStyle/>
+          <a:p>
+            <a:endParaRPr lang="he-IL"/>
+          </a:p>
+        </p:txBody>
+      </p:sp>
+      <p:pic>
+        <p:nvPicPr>
+          <p:cNvPr id="4" name="Picture 2"/>
+          <p:cNvPicPr>
+            <a:picLocks noChangeAspect="1" noChangeArrowheads="1"/>
+          </p:cNvPicPr>
+          <p:nvPr/>
+        </p:nvPicPr>
+        <p:blipFill>
+          <a:blip r:embed="rId2">
+            <a:extLst>
+              <a:ext uri="{28A0092B-C50C-407E-A947-70E740481C1C}">
+                <a14:useLocalDpi xmlns:a14="http://schemas.microsoft.com/office/drawing/2010/main" val="0"/>
+              </a:ext>
+            </a:extLst>
+          </a:blip>
+          <a:srcRect/>
+          <a:stretch>
+            <a:fillRect/>
+          </a:stretch>
+        </p:blipFill>
+        <p:spPr bwMode="auto">
+          <a:xfrm>
+            <a:off x="2960058" y="2016125"/>
+            <a:ext cx="6586209" cy="3449638"/>
+          </a:xfrm>
+          <a:prstGeom prst="rect">
+            <a:avLst/>
+          </a:prstGeom>
+          <a:noFill/>
+          <a:ln>
+            <a:noFill/>
+          </a:ln>
+          <a:extLst>
+            <a:ext uri="{909E8E84-426E-40DD-AFC4-6F175D3DCCD1}">
+              <a14:hiddenFill xmlns:a14="http://schemas.microsoft.com/office/drawing/2010/main">
+                <a:solidFill>
+                  <a:schemeClr val="accent1"/>
+                </a:solidFill>
+              </a14:hiddenFill>
+            </a:ext>
+            <a:ext uri="{91240B29-F687-4F45-9708-019B960494DF}">
+              <a14:hiddenLine xmlns:a14="http://schemas.microsoft.com/office/drawing/2010/main" w="9525">
+                <a:solidFill>
+                  <a:schemeClr val="tx1"/>
+                </a:solidFill>
+                <a:miter lim="800000"/>
+                <a:headEnd/>
+                <a:tailEnd/>
+              </a14:hiddenLine>
+            </a:ext>
+          </a:extLst>
+        </p:spPr>
+      </p:pic>
+    </p:spTree>
+    <p:extLst>
+      <p:ext uri="{BB962C8B-B14F-4D97-AF65-F5344CB8AC3E}">
+        <p14:creationId xmlns:p14="http://schemas.microsoft.com/office/powerpoint/2010/main" val="96395145"/>
+      </p:ext>
+    </p:extLst>
+  </p:cSld>
+  <p:clrMapOvr>
+    <a:masterClrMapping/>
+  </p:clrMapOvr>
+  <p:timing>
+    <p:tnLst>
+      <p:par>
+        <p:cTn id="1" dur="indefinite" restart="never" nodeType="tmRoot"/>
+      </p:par>
+    </p:tnLst>
+  </p:timing>
 </p:sld>
 </file>
 
@@ -4295,6 +4851,19 @@
               <a:rPr lang="en-US" dirty="0"/>
               <a:t>And even if you are an engineer it is really time consuming</a:t>
             </a:r>
+          </a:p>
+          <a:p>
+            <a:pPr lvl="1"/>
+            <a:r>
+              <a:rPr lang="en-US" dirty="0"/>
+              <a:t>From personal experience</a:t>
+            </a:r>
+          </a:p>
+          <a:p>
+            <a:pPr marL="457200" lvl="1" indent="0">
+              <a:buNone/>
+            </a:pPr>
+            <a:endParaRPr lang="en-US" dirty="0"/>
           </a:p>
         </p:txBody>
       </p:sp>
@@ -4439,7 +5008,7 @@
           <p:nvPr/>
         </p:nvPicPr>
         <p:blipFill>
-          <a:blip r:embed="rId5">
+          <a:blip r:embed="rId5" cstate="print">
             <a:clrChange>
               <a:clrFrom>
                 <a:srgbClr val="FFFFFF"/>
@@ -4855,33 +5424,100 @@
                                   </p:childTnLst>
                                 </p:cTn>
                               </p:par>
-                            </p:childTnLst>
-                          </p:cTn>
-                        </p:par>
-                      </p:childTnLst>
-                    </p:cTn>
-                  </p:par>
-                  <p:par>
-                    <p:cTn id="26" fill="hold">
-                      <p:stCondLst>
-                        <p:cond delay="indefinite"/>
-                      </p:stCondLst>
-                      <p:childTnLst>
-                        <p:par>
-                          <p:cTn id="27" fill="hold">
-                            <p:stCondLst>
-                              <p:cond delay="0"/>
-                            </p:stCondLst>
-                            <p:childTnLst>
                               <p:par>
-                                <p:cTn id="28" presetID="26" presetClass="entr" presetSubtype="0" fill="hold" nodeType="clickEffect">
+                                <p:cTn id="26" presetID="2" presetClass="entr" presetSubtype="4" fill="hold" grpId="0" nodeType="withEffect">
                                   <p:stCondLst>
                                     <p:cond delay="0"/>
                                   </p:stCondLst>
                                   <p:childTnLst>
                                     <p:set>
                                       <p:cBhvr>
-                                        <p:cTn id="29" dur="1" fill="hold">
+                                        <p:cTn id="27" dur="1" fill="hold">
+                                          <p:stCondLst>
+                                            <p:cond delay="0"/>
+                                          </p:stCondLst>
+                                        </p:cTn>
+                                        <p:tgtEl>
+                                          <p:spTgt spid="5">
+                                            <p:txEl>
+                                              <p:pRg st="7" end="7"/>
+                                            </p:txEl>
+                                          </p:spTgt>
+                                        </p:tgtEl>
+                                        <p:attrNameLst>
+                                          <p:attrName>style.visibility</p:attrName>
+                                        </p:attrNameLst>
+                                      </p:cBhvr>
+                                      <p:to>
+                                        <p:strVal val="visible"/>
+                                      </p:to>
+                                    </p:set>
+                                    <p:anim calcmode="lin" valueType="num">
+                                      <p:cBhvr additive="base">
+                                        <p:cTn id="28" dur="500" fill="hold"/>
+                                        <p:tgtEl>
+                                          <p:spTgt spid="5">
+                                            <p:txEl>
+                                              <p:pRg st="7" end="7"/>
+                                            </p:txEl>
+                                          </p:spTgt>
+                                        </p:tgtEl>
+                                        <p:attrNameLst>
+                                          <p:attrName>ppt_x</p:attrName>
+                                        </p:attrNameLst>
+                                      </p:cBhvr>
+                                      <p:tavLst>
+                                        <p:tav tm="0">
+                                          <p:val>
+                                            <p:strVal val="#ppt_x"/>
+                                          </p:val>
+                                        </p:tav>
+                                        <p:tav tm="100000">
+                                          <p:val>
+                                            <p:strVal val="#ppt_x"/>
+                                          </p:val>
+                                        </p:tav>
+                                      </p:tavLst>
+                                    </p:anim>
+                                    <p:anim calcmode="lin" valueType="num">
+                                      <p:cBhvr additive="base">
+                                        <p:cTn id="29" dur="500" fill="hold"/>
+                                        <p:tgtEl>
+                                          <p:spTgt spid="5">
+                                            <p:txEl>
+                                              <p:pRg st="7" end="7"/>
+                                            </p:txEl>
+                                          </p:spTgt>
+                                        </p:tgtEl>
+                                        <p:attrNameLst>
+                                          <p:attrName>ppt_y</p:attrName>
+                                        </p:attrNameLst>
+                                      </p:cBhvr>
+                                      <p:tavLst>
+                                        <p:tav tm="0">
+                                          <p:val>
+                                            <p:strVal val="1+#ppt_h/2"/>
+                                          </p:val>
+                                        </p:tav>
+                                        <p:tav tm="100000">
+                                          <p:val>
+                                            <p:strVal val="#ppt_y"/>
+                                          </p:val>
+                                        </p:tav>
+                                      </p:tavLst>
+                                    </p:anim>
+                                  </p:childTnLst>
+                                </p:cTn>
+                              </p:par>
+                              <p:par>
+                                <p:cTn id="30" presetID="26" presetClass="entr" presetSubtype="0" fill="hold" nodeType="withEffect">
+                                  <p:stCondLst>
+                                    <p:cond delay="0"/>
+                                  </p:stCondLst>
+                                  <p:childTnLst>
+                                    <p:set>
+                                      <p:cBhvr>
+                                        <p:cTn id="31" dur="1" fill="hold">
                                           <p:stCondLst>
                                             <p:cond delay="0"/>
                                           </p:stCondLst>
@@ -4899,7 +5535,7 @@
                                     </p:set>
                                     <p:animEffect transition="in" filter="wipe(down)">
                                       <p:cBhvr>
-                                        <p:cTn id="30" dur="580">
+                                        <p:cTn id="32" dur="580">
                                           <p:stCondLst>
                                             <p:cond delay="0"/>
                                           </p:stCondLst>
@@ -4911,7 +5547,7 @@
                                     </p:animEffect>
                                     <p:anim calcmode="lin" valueType="num">
                                       <p:cBhvr>
-                                        <p:cTn id="31" dur="1822" tmFilter="0,0; 0.14,0.36; 0.43,0.73; 0.71,0.91; 1.0,1.0">
+                                        <p:cTn id="33" dur="1822" tmFilter="0,0; 0.14,0.36; 0.43,0.73; 0.71,0.91; 1.0,1.0">
                                           <p:stCondLst>
                                             <p:cond delay="0"/>
                                           </p:stCondLst>
@@ -4938,7 +5574,7 @@
                                     </p:anim>
                                     <p:anim calcmode="lin" valueType="num">
                                       <p:cBhvr>
-                                        <p:cTn id="32" dur="664" tmFilter="0.0,0.0; 0.25,0.07; 0.50,0.2; 0.75,0.467; 1.0,1.0">
+                                        <p:cTn id="34" dur="664" tmFilter="0.0,0.0; 0.25,0.07; 0.50,0.2; 0.75,0.467; 1.0,1.0">
                                           <p:stCondLst>
                                             <p:cond delay="0"/>
                                           </p:stCondLst>
@@ -4965,7 +5601,7 @@
                                     </p:anim>
                                     <p:anim calcmode="lin" valueType="num">
                                       <p:cBhvr>
-                                        <p:cTn id="33" dur="664" tmFilter="0, 0; 0.125,0.2665; 0.25,0.4; 0.375,0.465; 0.5,0.5;  0.625,0.535; 0.75,0.6; 0.875,0.7335; 1,1">
+                                        <p:cTn id="35" dur="664" tmFilter="0, 0; 0.125,0.2665; 0.25,0.4; 0.375,0.465; 0.5,0.5;  0.625,0.535; 0.75,0.6; 0.875,0.7335; 1,1">
                                           <p:stCondLst>
                                             <p:cond delay="664"/>
                                           </p:stCondLst>
@@ -4992,7 +5628,7 @@
                                     </p:anim>
                                     <p:anim calcmode="lin" valueType="num">
                                       <p:cBhvr>
-                                        <p:cTn id="34" dur="332" tmFilter="0, 0; 0.125,0.2665; 0.25,0.4; 0.375,0.465; 0.5,0.5;  0.625,0.535; 0.75,0.6; 0.875,0.7335; 1,1">
+                                        <p:cTn id="36" dur="332" tmFilter="0, 0; 0.125,0.2665; 0.25,0.4; 0.375,0.465; 0.5,0.5;  0.625,0.535; 0.75,0.6; 0.875,0.7335; 1,1">
                                           <p:stCondLst>
                                             <p:cond delay="1324"/>
                                           </p:stCondLst>
@@ -5019,7 +5655,7 @@
                                     </p:anim>
                                     <p:anim calcmode="lin" valueType="num">
                                       <p:cBhvr>
-                                        <p:cTn id="35" dur="164" tmFilter="0, 0; 0.125,0.2665; 0.25,0.4; 0.375,0.465; 0.5,0.5;  0.625,0.535; 0.75,0.6; 0.875,0.7335; 1,1">
+                                        <p:cTn id="37" dur="164" tmFilter="0, 0; 0.125,0.2665; 0.25,0.4; 0.375,0.465; 0.5,0.5;  0.625,0.535; 0.75,0.6; 0.875,0.7335; 1,1">
                                           <p:stCondLst>
                                             <p:cond delay="1656"/>
                                           </p:stCondLst>
@@ -5046,7 +5682,7 @@
                                     </p:anim>
                                     <p:animScale>
                                       <p:cBhvr>
-                                        <p:cTn id="36" dur="26">
+                                        <p:cTn id="38" dur="26">
                                           <p:stCondLst>
                                             <p:cond delay="650"/>
                                           </p:stCondLst>
@@ -5059,7 +5695,7 @@
                                     </p:animScale>
                                     <p:animScale>
                                       <p:cBhvr>
-                                        <p:cTn id="37" dur="166" decel="50000">
+                                        <p:cTn id="39" dur="166" decel="50000">
                                           <p:stCondLst>
                                             <p:cond delay="676"/>
                                           </p:stCondLst>
@@ -5072,7 +5708,7 @@
                                     </p:animScale>
                                     <p:animScale>
                                       <p:cBhvr>
-                                        <p:cTn id="38" dur="26">
+                                        <p:cTn id="40" dur="26">
                                           <p:stCondLst>
                                             <p:cond delay="1312"/>
                                           </p:stCondLst>
@@ -5085,7 +5721,7 @@
                                     </p:animScale>
                                     <p:animScale>
                                       <p:cBhvr>
-                                        <p:cTn id="39" dur="166" decel="50000">
+                                        <p:cTn id="41" dur="166" decel="50000">
                                           <p:stCondLst>
                                             <p:cond delay="1338"/>
                                           </p:stCondLst>
@@ -5098,7 +5734,7 @@
                                     </p:animScale>
                                     <p:animScale>
                                       <p:cBhvr>
-                                        <p:cTn id="40" dur="26">
+                                        <p:cTn id="42" dur="26">
                                           <p:stCondLst>
                                             <p:cond delay="1642"/>
                                           </p:stCondLst>
@@ -5111,7 +5747,7 @@
                                     </p:animScale>
                                     <p:animScale>
                                       <p:cBhvr>
-                                        <p:cTn id="41" dur="166" decel="50000">
+                                        <p:cTn id="43" dur="166" decel="50000">
                                           <p:stCondLst>
                                             <p:cond delay="1668"/>
                                           </p:stCondLst>
@@ -5124,7 +5760,7 @@
                                     </p:animScale>
                                     <p:animScale>
                                       <p:cBhvr>
-                                        <p:cTn id="42" dur="26">
+                                        <p:cTn id="44" dur="26">
                                           <p:stCondLst>
                                             <p:cond delay="1808"/>
                                           </p:stCondLst>
@@ -5137,7 +5773,7 @@
                                     </p:animScale>
                                     <p:animScale>
                                       <p:cBhvr>
-                                        <p:cTn id="43" dur="166" decel="50000">
+                                        <p:cTn id="45" dur="166" decel="50000">
                                           <p:stCondLst>
                                             <p:cond delay="1834"/>
                                           </p:stCondLst>
@@ -5335,7 +5971,7 @@
           <p:nvPr/>
         </p:nvPicPr>
         <p:blipFill>
-          <a:blip r:embed="rId4">
+          <a:blip r:embed="rId4" cstate="print">
             <a:extLst>
               <a:ext uri="{28A0092B-C50C-407E-A947-70E740481C1C}">
                 <a14:useLocalDpi xmlns:a14="http://schemas.microsoft.com/office/drawing/2010/main" val="0"/>
@@ -5831,58 +6467,61 @@
           <a:p>
             <a:r>
               <a:rPr lang="en-US" dirty="0"/>
-              <a:t>Solution</a:t>
-            </a:r>
-          </a:p>
-        </p:txBody>
-      </p:sp>
-      <p:sp>
-        <p:nvSpPr>
-          <p:cNvPr id="3" name="Content Placeholder 2"/>
-          <p:cNvSpPr>
-            <a:spLocks noGrp="1"/>
-          </p:cNvSpPr>
-          <p:nvPr>
-            <p:ph idx="1"/>
-          </p:nvPr>
-        </p:nvSpPr>
-        <p:spPr/>
-        <p:txBody>
-          <a:bodyPr/>
-          <a:lstStyle/>
-          <a:p>
-            <a:r>
-              <a:rPr lang="en-US" dirty="0"/>
-              <a:t>Direct Feature detection</a:t>
-            </a:r>
-          </a:p>
-          <a:p>
-            <a:endParaRPr lang="en-US" dirty="0"/>
-          </a:p>
-          <a:p>
-            <a:endParaRPr lang="en-US" dirty="0"/>
-          </a:p>
-          <a:p>
-            <a:endParaRPr lang="en-US" dirty="0"/>
-          </a:p>
-          <a:p>
-            <a:r>
-              <a:rPr lang="en-US" dirty="0"/>
-              <a:t>Convolutional Neural Network learning solution</a:t>
-            </a:r>
-          </a:p>
-        </p:txBody>
-      </p:sp>
-      <p:sp>
-        <p:nvSpPr>
-          <p:cNvPr id="4" name="TextBox 3"/>
+              <a:t>The dataset</a:t>
+            </a:r>
+            <a:endParaRPr lang="he-IL" dirty="0"/>
+          </a:p>
+        </p:txBody>
+      </p:sp>
+      <p:pic>
+        <p:nvPicPr>
+          <p:cNvPr id="1026" name="Picture 2" descr="http://shapedo.com/uploads/images/71/%D7%9E%D7%92%D7%9F_%D7%A2%D7%91%D7%95%D7%93%D7%95%D7%AA_%D7%94%D7%A0%D7%93%D7%A1%D7%99%D7%95%D7%AA/49682-71303.png"/>
+          <p:cNvPicPr>
+            <a:picLocks noChangeAspect="1" noChangeArrowheads="1"/>
+          </p:cNvPicPr>
+          <p:nvPr/>
+        </p:nvPicPr>
+        <p:blipFill rotWithShape="1">
+          <a:blip r:embed="rId2" cstate="print">
+            <a:extLst>
+              <a:ext uri="{28A0092B-C50C-407E-A947-70E740481C1C}">
+                <a14:useLocalDpi xmlns:a14="http://schemas.microsoft.com/office/drawing/2010/main" val="0"/>
+              </a:ext>
+            </a:extLst>
+          </a:blip>
+          <a:srcRect t="31191" b="28185"/>
+          <a:stretch/>
+        </p:blipFill>
+        <p:spPr bwMode="auto">
+          <a:xfrm>
+            <a:off x="1343275" y="1712889"/>
+            <a:ext cx="8622917" cy="3503053"/>
+          </a:xfrm>
+          <a:prstGeom prst="rect">
+            <a:avLst/>
+          </a:prstGeom>
+          <a:noFill/>
+          <a:extLst>
+            <a:ext uri="{909E8E84-426E-40DD-AFC4-6F175D3DCCD1}">
+              <a14:hiddenFill xmlns:a14="http://schemas.microsoft.com/office/drawing/2010/main">
+                <a:solidFill>
+                  <a:srgbClr val="FFFFFF"/>
+                </a:solidFill>
+              </a14:hiddenFill>
+            </a:ext>
+          </a:extLst>
+        </p:spPr>
+      </p:pic>
+      <p:sp>
+        <p:nvSpPr>
+          <p:cNvPr id="3" name="TextBox 2"/>
           <p:cNvSpPr txBox="1"/>
           <p:nvPr/>
         </p:nvSpPr>
         <p:spPr>
-          <a:xfrm rot="19464081">
-            <a:off x="3695468" y="2540036"/>
-            <a:ext cx="6834732" cy="1569660"/>
+          <a:xfrm>
+            <a:off x="1046392" y="5274116"/>
+            <a:ext cx="10947686" cy="923330"/>
           </a:xfrm>
           <a:prstGeom prst="rect">
             <a:avLst/>
@@ -5890,32 +6529,62 @@
           <a:noFill/>
         </p:spPr>
         <p:txBody>
-          <a:bodyPr wrap="square" rtlCol="0">
+          <a:bodyPr wrap="square" rtlCol="1">
             <a:spAutoFit/>
           </a:bodyPr>
           <a:lstStyle/>
           <a:p>
             <a:r>
-              <a:rPr lang="en-US" sz="9600" dirty="0">
-                <a:solidFill>
-                  <a:srgbClr val="FF0000"/>
-                </a:solidFill>
-              </a:rPr>
-              <a:t>Feasible</a:t>
-            </a:r>
+              <a:rPr lang="en-US" dirty="0"/>
+              <a:t>de las Heras, </a:t>
+            </a:r>
+            <a:r>
+              <a:rPr lang="en-US" dirty="0" err="1"/>
+              <a:t>Lluís</a:t>
+            </a:r>
+            <a:r>
+              <a:rPr lang="en-US" dirty="0"/>
+              <a:t>-Pere, et al. "CVC-FP and SGT: a new database for structural floor plan analysis and its </a:t>
+            </a:r>
+            <a:r>
+              <a:rPr lang="en-US" dirty="0" err="1"/>
+              <a:t>groundtruthing</a:t>
+            </a:r>
+            <a:r>
+              <a:rPr lang="en-US" dirty="0"/>
+              <a:t> tool." </a:t>
+            </a:r>
+            <a:r>
+              <a:rPr lang="en-US" i="1" dirty="0"/>
+              <a:t>International Journal on Document Analysis and Recognition (IJDAR)</a:t>
+            </a:r>
+            <a:r>
+              <a:rPr lang="en-US" dirty="0"/>
+              <a:t> 18.1 (2015): 15-30.‏</a:t>
+            </a:r>
+          </a:p>
+          <a:p>
+            <a:endParaRPr lang="he-IL" dirty="0"/>
           </a:p>
         </p:txBody>
       </p:sp>
     </p:spTree>
     <p:extLst>
       <p:ext uri="{BB962C8B-B14F-4D97-AF65-F5344CB8AC3E}">
-        <p14:creationId xmlns:p14="http://schemas.microsoft.com/office/powerpoint/2010/main" val="166050770"/>
+        <p14:creationId xmlns:p14="http://schemas.microsoft.com/office/powerpoint/2010/main" val="2324027337"/>
       </p:ext>
     </p:extLst>
   </p:cSld>
   <p:clrMapOvr>
     <a:masterClrMapping/>
   </p:clrMapOvr>
+  <p:timing>
+    <p:tnLst>
+      <p:par>
+        <p:cTn id="1" dur="indefinite" restart="never" nodeType="tmRoot"/>
+      </p:par>
+    </p:tnLst>
+  </p:timing>
 </p:sld>
 </file>
 
@@ -5953,28 +6622,1144 @@
           <a:p>
             <a:r>
               <a:rPr lang="en-US" dirty="0"/>
-              <a:t>Meet the </a:t>
-            </a:r>
-            <a:r>
-              <a:rPr lang="en-US" dirty="0" err="1"/>
-              <a:t>doorks</a:t>
-            </a:r>
-            <a:endParaRPr lang="en-US" dirty="0"/>
+              <a:t>The Dataset</a:t>
+            </a:r>
+            <a:endParaRPr lang="he-IL" dirty="0"/>
           </a:p>
         </p:txBody>
       </p:sp>
       <p:pic>
         <p:nvPicPr>
-          <p:cNvPr id="4" name="Content Placeholder 3"/>
+          <p:cNvPr id="2051" name="Picture 3" descr="C:\Users\Liat\Documents\dorks\ImagesGT - Copy\32_img.svg7.png"/>
           <p:cNvPicPr>
-            <a:picLocks noGrp="1" noChangeAspect="1"/>
+            <a:picLocks noChangeAspect="1" noChangeArrowheads="1"/>
           </p:cNvPicPr>
+          <p:nvPr/>
+        </p:nvPicPr>
+        <p:blipFill>
+          <a:blip r:embed="rId2">
+            <a:extLst>
+              <a:ext uri="{28A0092B-C50C-407E-A947-70E740481C1C}">
+                <a14:useLocalDpi xmlns:a14="http://schemas.microsoft.com/office/drawing/2010/main" val="0"/>
+              </a:ext>
+            </a:extLst>
+          </a:blip>
+          <a:srcRect/>
+          <a:stretch>
+            <a:fillRect/>
+          </a:stretch>
+        </p:blipFill>
+        <p:spPr bwMode="auto">
+          <a:xfrm>
+            <a:off x="6070242" y="2867025"/>
+            <a:ext cx="476250" cy="476250"/>
+          </a:xfrm>
+          <a:prstGeom prst="rect">
+            <a:avLst/>
+          </a:prstGeom>
+          <a:noFill/>
+          <a:extLst>
+            <a:ext uri="{909E8E84-426E-40DD-AFC4-6F175D3DCCD1}">
+              <a14:hiddenFill xmlns:a14="http://schemas.microsoft.com/office/drawing/2010/main">
+                <a:solidFill>
+                  <a:srgbClr val="FFFFFF"/>
+                </a:solidFill>
+              </a14:hiddenFill>
+            </a:ext>
+          </a:extLst>
+        </p:spPr>
+      </p:pic>
+      <p:pic>
+        <p:nvPicPr>
+          <p:cNvPr id="2052" name="Picture 4" descr="C:\Users\Liat\Documents\dorks\ImagesGT - Copy\32_img.svg6.png"/>
+          <p:cNvPicPr>
+            <a:picLocks noChangeAspect="1" noChangeArrowheads="1"/>
+          </p:cNvPicPr>
+          <p:nvPr/>
+        </p:nvPicPr>
+        <p:blipFill>
+          <a:blip r:embed="rId3">
+            <a:extLst>
+              <a:ext uri="{28A0092B-C50C-407E-A947-70E740481C1C}">
+                <a14:useLocalDpi xmlns:a14="http://schemas.microsoft.com/office/drawing/2010/main" val="0"/>
+              </a:ext>
+            </a:extLst>
+          </a:blip>
+          <a:srcRect/>
+          <a:stretch>
+            <a:fillRect/>
+          </a:stretch>
+        </p:blipFill>
+        <p:spPr bwMode="auto">
+          <a:xfrm>
+            <a:off x="5160270" y="2824229"/>
+            <a:ext cx="476250" cy="476250"/>
+          </a:xfrm>
+          <a:prstGeom prst="rect">
+            <a:avLst/>
+          </a:prstGeom>
+          <a:noFill/>
+          <a:extLst>
+            <a:ext uri="{909E8E84-426E-40DD-AFC4-6F175D3DCCD1}">
+              <a14:hiddenFill xmlns:a14="http://schemas.microsoft.com/office/drawing/2010/main">
+                <a:solidFill>
+                  <a:srgbClr val="FFFFFF"/>
+                </a:solidFill>
+              </a14:hiddenFill>
+            </a:ext>
+          </a:extLst>
+        </p:spPr>
+      </p:pic>
+      <p:pic>
+        <p:nvPicPr>
+          <p:cNvPr id="2053" name="Picture 5" descr="C:\Users\Liat\Documents\dorks\ImagesGT - Copy\32_img.svg5.png"/>
+          <p:cNvPicPr>
+            <a:picLocks noChangeAspect="1" noChangeArrowheads="1"/>
+          </p:cNvPicPr>
+          <p:nvPr/>
+        </p:nvPicPr>
+        <p:blipFill>
+          <a:blip r:embed="rId4">
+            <a:extLst>
+              <a:ext uri="{28A0092B-C50C-407E-A947-70E740481C1C}">
+                <a14:useLocalDpi xmlns:a14="http://schemas.microsoft.com/office/drawing/2010/main" val="0"/>
+              </a:ext>
+            </a:extLst>
+          </a:blip>
+          <a:srcRect/>
+          <a:stretch>
+            <a:fillRect/>
+          </a:stretch>
+        </p:blipFill>
+        <p:spPr bwMode="auto">
+          <a:xfrm>
+            <a:off x="3975681" y="2824229"/>
+            <a:ext cx="476250" cy="476250"/>
+          </a:xfrm>
+          <a:prstGeom prst="rect">
+            <a:avLst/>
+          </a:prstGeom>
+          <a:noFill/>
+          <a:extLst>
+            <a:ext uri="{909E8E84-426E-40DD-AFC4-6F175D3DCCD1}">
+              <a14:hiddenFill xmlns:a14="http://schemas.microsoft.com/office/drawing/2010/main">
+                <a:solidFill>
+                  <a:srgbClr val="FFFFFF"/>
+                </a:solidFill>
+              </a14:hiddenFill>
+            </a:ext>
+          </a:extLst>
+        </p:spPr>
+      </p:pic>
+      <p:pic>
+        <p:nvPicPr>
+          <p:cNvPr id="2054" name="Picture 6" descr="C:\Users\Liat\Documents\dorks\ImagesGT - Copy\32_img.svg4.png"/>
+          <p:cNvPicPr>
+            <a:picLocks noChangeAspect="1" noChangeArrowheads="1"/>
+          </p:cNvPicPr>
+          <p:nvPr/>
+        </p:nvPicPr>
+        <p:blipFill>
+          <a:blip r:embed="rId5">
+            <a:extLst>
+              <a:ext uri="{28A0092B-C50C-407E-A947-70E740481C1C}">
+                <a14:useLocalDpi xmlns:a14="http://schemas.microsoft.com/office/drawing/2010/main" val="0"/>
+              </a:ext>
+            </a:extLst>
+          </a:blip>
+          <a:srcRect/>
+          <a:stretch>
+            <a:fillRect/>
+          </a:stretch>
+        </p:blipFill>
+        <p:spPr bwMode="auto">
+          <a:xfrm>
+            <a:off x="2880709" y="2842340"/>
+            <a:ext cx="476250" cy="476250"/>
+          </a:xfrm>
+          <a:prstGeom prst="rect">
+            <a:avLst/>
+          </a:prstGeom>
+          <a:noFill/>
+          <a:extLst>
+            <a:ext uri="{909E8E84-426E-40DD-AFC4-6F175D3DCCD1}">
+              <a14:hiddenFill xmlns:a14="http://schemas.microsoft.com/office/drawing/2010/main">
+                <a:solidFill>
+                  <a:srgbClr val="FFFFFF"/>
+                </a:solidFill>
+              </a14:hiddenFill>
+            </a:ext>
+          </a:extLst>
+        </p:spPr>
+      </p:pic>
+      <p:pic>
+        <p:nvPicPr>
+          <p:cNvPr id="2055" name="Picture 7"/>
+          <p:cNvPicPr>
+            <a:picLocks noChangeAspect="1" noChangeArrowheads="1"/>
+          </p:cNvPicPr>
+          <p:nvPr/>
+        </p:nvPicPr>
+        <p:blipFill>
+          <a:blip r:embed="rId6">
+            <a:extLst>
+              <a:ext uri="{28A0092B-C50C-407E-A947-70E740481C1C}">
+                <a14:useLocalDpi xmlns:a14="http://schemas.microsoft.com/office/drawing/2010/main" val="0"/>
+              </a:ext>
+            </a:extLst>
+          </a:blip>
+          <a:srcRect/>
+          <a:stretch>
+            <a:fillRect/>
+          </a:stretch>
+        </p:blipFill>
+        <p:spPr bwMode="auto">
+          <a:xfrm>
+            <a:off x="6939700" y="2814570"/>
+            <a:ext cx="476250" cy="476250"/>
+          </a:xfrm>
+          <a:prstGeom prst="rect">
+            <a:avLst/>
+          </a:prstGeom>
+          <a:noFill/>
+          <a:ln>
+            <a:noFill/>
+          </a:ln>
+          <a:extLst>
+            <a:ext uri="{909E8E84-426E-40DD-AFC4-6F175D3DCCD1}">
+              <a14:hiddenFill xmlns:a14="http://schemas.microsoft.com/office/drawing/2010/main">
+                <a:solidFill>
+                  <a:schemeClr val="accent1"/>
+                </a:solidFill>
+              </a14:hiddenFill>
+            </a:ext>
+            <a:ext uri="{91240B29-F687-4F45-9708-019B960494DF}">
+              <a14:hiddenLine xmlns:a14="http://schemas.microsoft.com/office/drawing/2010/main" w="9525">
+                <a:solidFill>
+                  <a:schemeClr val="tx1"/>
+                </a:solidFill>
+                <a:miter lim="800000"/>
+                <a:headEnd/>
+                <a:tailEnd/>
+              </a14:hiddenLine>
+            </a:ext>
+          </a:extLst>
+        </p:spPr>
+      </p:pic>
+      <p:sp>
+        <p:nvSpPr>
+          <p:cNvPr id="3" name="TextBox 2"/>
+          <p:cNvSpPr txBox="1"/>
+          <p:nvPr/>
+        </p:nvSpPr>
+        <p:spPr>
+          <a:xfrm>
+            <a:off x="1429554" y="2142049"/>
+            <a:ext cx="841897" cy="369332"/>
+          </a:xfrm>
+          <a:prstGeom prst="rect">
+            <a:avLst/>
+          </a:prstGeom>
+          <a:noFill/>
+        </p:spPr>
+        <p:txBody>
+          <a:bodyPr wrap="none" rtlCol="1">
+            <a:spAutoFit/>
+          </a:bodyPr>
+          <a:lstStyle/>
+          <a:p>
+            <a:r>
+              <a:rPr lang="en-US" dirty="0"/>
+              <a:t>Doors:</a:t>
+            </a:r>
+            <a:endParaRPr lang="he-IL" dirty="0"/>
+          </a:p>
+        </p:txBody>
+      </p:sp>
+      <p:pic>
+        <p:nvPicPr>
+          <p:cNvPr id="2056" name="Picture 8" descr="C:\Users\Liat\Documents\dorks\no doors\1_1_708.png"/>
+          <p:cNvPicPr>
+            <a:picLocks noChangeAspect="1" noChangeArrowheads="1"/>
+          </p:cNvPicPr>
+          <p:nvPr/>
+        </p:nvPicPr>
+        <p:blipFill>
+          <a:blip r:embed="rId7">
+            <a:extLst>
+              <a:ext uri="{28A0092B-C50C-407E-A947-70E740481C1C}">
+                <a14:useLocalDpi xmlns:a14="http://schemas.microsoft.com/office/drawing/2010/main" val="0"/>
+              </a:ext>
+            </a:extLst>
+          </a:blip>
+          <a:srcRect/>
+          <a:stretch>
+            <a:fillRect/>
+          </a:stretch>
+        </p:blipFill>
+        <p:spPr bwMode="auto">
+          <a:xfrm>
+            <a:off x="2910759" y="4556035"/>
+            <a:ext cx="476250" cy="476250"/>
+          </a:xfrm>
+          <a:prstGeom prst="rect">
+            <a:avLst/>
+          </a:prstGeom>
+          <a:noFill/>
+          <a:extLst>
+            <a:ext uri="{909E8E84-426E-40DD-AFC4-6F175D3DCCD1}">
+              <a14:hiddenFill xmlns:a14="http://schemas.microsoft.com/office/drawing/2010/main">
+                <a:solidFill>
+                  <a:srgbClr val="FFFFFF"/>
+                </a:solidFill>
+              </a14:hiddenFill>
+            </a:ext>
+          </a:extLst>
+        </p:spPr>
+      </p:pic>
+      <p:pic>
+        <p:nvPicPr>
+          <p:cNvPr id="2058" name="Picture 10" descr="C:\Users\Liat\Documents\dorks\no doors\1_1_849.png"/>
+          <p:cNvPicPr>
+            <a:picLocks noChangeAspect="1" noChangeArrowheads="1"/>
+          </p:cNvPicPr>
+          <p:nvPr/>
+        </p:nvPicPr>
+        <p:blipFill>
+          <a:blip r:embed="rId8">
+            <a:extLst>
+              <a:ext uri="{28A0092B-C50C-407E-A947-70E740481C1C}">
+                <a14:useLocalDpi xmlns:a14="http://schemas.microsoft.com/office/drawing/2010/main" val="0"/>
+              </a:ext>
+            </a:extLst>
+          </a:blip>
+          <a:srcRect/>
+          <a:stretch>
+            <a:fillRect/>
+          </a:stretch>
+        </p:blipFill>
+        <p:spPr bwMode="auto">
+          <a:xfrm>
+            <a:off x="6939700" y="4549863"/>
+            <a:ext cx="476250" cy="476250"/>
+          </a:xfrm>
+          <a:prstGeom prst="rect">
+            <a:avLst/>
+          </a:prstGeom>
+          <a:noFill/>
+          <a:extLst>
+            <a:ext uri="{909E8E84-426E-40DD-AFC4-6F175D3DCCD1}">
+              <a14:hiddenFill xmlns:a14="http://schemas.microsoft.com/office/drawing/2010/main">
+                <a:solidFill>
+                  <a:srgbClr val="FFFFFF"/>
+                </a:solidFill>
+              </a14:hiddenFill>
+            </a:ext>
+          </a:extLst>
+        </p:spPr>
+      </p:pic>
+      <p:pic>
+        <p:nvPicPr>
+          <p:cNvPr id="2060" name="Picture 12" descr="C:\Users\Liat\Documents\dorks\no doors\1_1_724.png"/>
+          <p:cNvPicPr>
+            <a:picLocks noChangeAspect="1" noChangeArrowheads="1"/>
+          </p:cNvPicPr>
+          <p:nvPr/>
+        </p:nvPicPr>
+        <p:blipFill>
+          <a:blip r:embed="rId9">
+            <a:extLst>
+              <a:ext uri="{28A0092B-C50C-407E-A947-70E740481C1C}">
+                <a14:useLocalDpi xmlns:a14="http://schemas.microsoft.com/office/drawing/2010/main" val="0"/>
+              </a:ext>
+            </a:extLst>
+          </a:blip>
+          <a:srcRect/>
+          <a:stretch>
+            <a:fillRect/>
+          </a:stretch>
+        </p:blipFill>
+        <p:spPr bwMode="auto">
+          <a:xfrm>
+            <a:off x="3975681" y="4556035"/>
+            <a:ext cx="476250" cy="476250"/>
+          </a:xfrm>
+          <a:prstGeom prst="rect">
+            <a:avLst/>
+          </a:prstGeom>
+          <a:noFill/>
+          <a:extLst>
+            <a:ext uri="{909E8E84-426E-40DD-AFC4-6F175D3DCCD1}">
+              <a14:hiddenFill xmlns:a14="http://schemas.microsoft.com/office/drawing/2010/main">
+                <a:solidFill>
+                  <a:srgbClr val="FFFFFF"/>
+                </a:solidFill>
+              </a14:hiddenFill>
+            </a:ext>
+          </a:extLst>
+        </p:spPr>
+      </p:pic>
+      <p:pic>
+        <p:nvPicPr>
+          <p:cNvPr id="2061" name="Picture 13" descr="C:\Users\Liat\Documents\dorks\no doors\1_1_866.png"/>
+          <p:cNvPicPr>
+            <a:picLocks noChangeAspect="1" noChangeArrowheads="1"/>
+          </p:cNvPicPr>
+          <p:nvPr/>
+        </p:nvPicPr>
+        <p:blipFill>
+          <a:blip r:embed="rId10">
+            <a:extLst>
+              <a:ext uri="{28A0092B-C50C-407E-A947-70E740481C1C}">
+                <a14:useLocalDpi xmlns:a14="http://schemas.microsoft.com/office/drawing/2010/main" val="0"/>
+              </a:ext>
+            </a:extLst>
+          </a:blip>
+          <a:srcRect/>
+          <a:stretch>
+            <a:fillRect/>
+          </a:stretch>
+        </p:blipFill>
+        <p:spPr bwMode="auto">
+          <a:xfrm>
+            <a:off x="5160270" y="4556035"/>
+            <a:ext cx="476250" cy="476250"/>
+          </a:xfrm>
+          <a:prstGeom prst="rect">
+            <a:avLst/>
+          </a:prstGeom>
+          <a:noFill/>
+          <a:extLst>
+            <a:ext uri="{909E8E84-426E-40DD-AFC4-6F175D3DCCD1}">
+              <a14:hiddenFill xmlns:a14="http://schemas.microsoft.com/office/drawing/2010/main">
+                <a:solidFill>
+                  <a:srgbClr val="FFFFFF"/>
+                </a:solidFill>
+              </a14:hiddenFill>
+            </a:ext>
+          </a:extLst>
+        </p:spPr>
+      </p:pic>
+      <p:pic>
+        <p:nvPicPr>
+          <p:cNvPr id="2062" name="Picture 14" descr="C:\Users\Liat\Documents\dorks\no doors\1_1_794.png"/>
+          <p:cNvPicPr>
+            <a:picLocks noChangeAspect="1" noChangeArrowheads="1"/>
+          </p:cNvPicPr>
+          <p:nvPr/>
+        </p:nvPicPr>
+        <p:blipFill>
+          <a:blip r:embed="rId11">
+            <a:extLst>
+              <a:ext uri="{28A0092B-C50C-407E-A947-70E740481C1C}">
+                <a14:useLocalDpi xmlns:a14="http://schemas.microsoft.com/office/drawing/2010/main" val="0"/>
+              </a:ext>
+            </a:extLst>
+          </a:blip>
+          <a:srcRect/>
+          <a:stretch>
+            <a:fillRect/>
+          </a:stretch>
+        </p:blipFill>
+        <p:spPr bwMode="auto">
+          <a:xfrm>
+            <a:off x="6066255" y="4556035"/>
+            <a:ext cx="476250" cy="476250"/>
+          </a:xfrm>
+          <a:prstGeom prst="rect">
+            <a:avLst/>
+          </a:prstGeom>
+          <a:noFill/>
+          <a:extLst>
+            <a:ext uri="{909E8E84-426E-40DD-AFC4-6F175D3DCCD1}">
+              <a14:hiddenFill xmlns:a14="http://schemas.microsoft.com/office/drawing/2010/main">
+                <a:solidFill>
+                  <a:srgbClr val="FFFFFF"/>
+                </a:solidFill>
+              </a14:hiddenFill>
+            </a:ext>
+          </a:extLst>
+        </p:spPr>
+      </p:pic>
+      <p:sp>
+        <p:nvSpPr>
+          <p:cNvPr id="18" name="TextBox 17"/>
+          <p:cNvSpPr txBox="1"/>
+          <p:nvPr/>
+        </p:nvSpPr>
+        <p:spPr>
+          <a:xfrm>
+            <a:off x="1447202" y="3968701"/>
+            <a:ext cx="1463862" cy="369332"/>
+          </a:xfrm>
+          <a:prstGeom prst="rect">
+            <a:avLst/>
+          </a:prstGeom>
+          <a:noFill/>
+        </p:spPr>
+        <p:txBody>
+          <a:bodyPr wrap="none" rtlCol="1">
+            <a:spAutoFit/>
+          </a:bodyPr>
+          <a:lstStyle/>
+          <a:p>
+            <a:r>
+              <a:rPr lang="en-US" dirty="0"/>
+              <a:t>Not doors…</a:t>
+            </a:r>
+            <a:endParaRPr lang="he-IL" dirty="0"/>
+          </a:p>
+        </p:txBody>
+      </p:sp>
+      <p:pic>
+        <p:nvPicPr>
+          <p:cNvPr id="2064" name="Picture 16"/>
+          <p:cNvPicPr>
+            <a:picLocks noChangeAspect="1" noChangeArrowheads="1"/>
+          </p:cNvPicPr>
+          <p:nvPr/>
+        </p:nvPicPr>
+        <p:blipFill rotWithShape="1">
+          <a:blip r:embed="rId12">
+            <a:extLst>
+              <a:ext uri="{28A0092B-C50C-407E-A947-70E740481C1C}">
+                <a14:useLocalDpi xmlns:a14="http://schemas.microsoft.com/office/drawing/2010/main" val="0"/>
+              </a:ext>
+            </a:extLst>
+          </a:blip>
+          <a:srcRect l="20804" t="10517" r="706" b="14004"/>
+          <a:stretch/>
+        </p:blipFill>
+        <p:spPr bwMode="auto">
+          <a:xfrm>
+            <a:off x="1074662" y="830687"/>
+            <a:ext cx="10212603" cy="5233937"/>
+          </a:xfrm>
+          <a:prstGeom prst="rect">
+            <a:avLst/>
+          </a:prstGeom>
+          <a:noFill/>
+          <a:ln>
+            <a:noFill/>
+          </a:ln>
+          <a:extLst>
+            <a:ext uri="{909E8E84-426E-40DD-AFC4-6F175D3DCCD1}">
+              <a14:hiddenFill xmlns:a14="http://schemas.microsoft.com/office/drawing/2010/main">
+                <a:solidFill>
+                  <a:schemeClr val="accent1"/>
+                </a:solidFill>
+              </a14:hiddenFill>
+            </a:ext>
+            <a:ext uri="{91240B29-F687-4F45-9708-019B960494DF}">
+              <a14:hiddenLine xmlns:a14="http://schemas.microsoft.com/office/drawing/2010/main" w="9525">
+                <a:solidFill>
+                  <a:schemeClr val="tx1"/>
+                </a:solidFill>
+                <a:miter lim="800000"/>
+                <a:headEnd/>
+                <a:tailEnd/>
+              </a14:hiddenLine>
+            </a:ext>
+          </a:extLst>
+        </p:spPr>
+      </p:pic>
+      <p:pic>
+        <p:nvPicPr>
+          <p:cNvPr id="1026" name="Picture 2" descr="http://www.clipartbest.com/cliparts/4c9/on8/4c9on8bzi.jpeg"/>
+          <p:cNvPicPr>
+            <a:picLocks noChangeAspect="1" noChangeArrowheads="1"/>
+          </p:cNvPicPr>
+          <p:nvPr/>
+        </p:nvPicPr>
+        <p:blipFill>
+          <a:blip r:embed="rId13" cstate="print">
+            <a:clrChange>
+              <a:clrFrom>
+                <a:srgbClr val="FFFFFF"/>
+              </a:clrFrom>
+              <a:clrTo>
+                <a:srgbClr val="FFFFFF">
+                  <a:alpha val="0"/>
+                </a:srgbClr>
+              </a:clrTo>
+            </a:clrChange>
+            <a:extLst>
+              <a:ext uri="{28A0092B-C50C-407E-A947-70E740481C1C}">
+                <a14:useLocalDpi xmlns:a14="http://schemas.microsoft.com/office/drawing/2010/main" val="0"/>
+              </a:ext>
+            </a:extLst>
+          </a:blip>
+          <a:srcRect/>
+          <a:stretch>
+            <a:fillRect/>
+          </a:stretch>
+        </p:blipFill>
+        <p:spPr bwMode="auto">
+          <a:xfrm>
+            <a:off x="8256581" y="3343275"/>
+            <a:ext cx="3897910" cy="3152775"/>
+          </a:xfrm>
+          <a:prstGeom prst="rect">
+            <a:avLst/>
+          </a:prstGeom>
+          <a:noFill/>
+          <a:extLst>
+            <a:ext uri="{909E8E84-426E-40DD-AFC4-6F175D3DCCD1}">
+              <a14:hiddenFill xmlns:a14="http://schemas.microsoft.com/office/drawing/2010/main">
+                <a:solidFill>
+                  <a:srgbClr val="FFFFFF"/>
+                </a:solidFill>
+              </a14:hiddenFill>
+            </a:ext>
+          </a:extLst>
+        </p:spPr>
+      </p:pic>
+    </p:spTree>
+    <p:extLst>
+      <p:ext uri="{BB962C8B-B14F-4D97-AF65-F5344CB8AC3E}">
+        <p14:creationId xmlns:p14="http://schemas.microsoft.com/office/powerpoint/2010/main" val="1759829449"/>
+      </p:ext>
+    </p:extLst>
+  </p:cSld>
+  <p:clrMapOvr>
+    <a:masterClrMapping/>
+  </p:clrMapOvr>
+  <p:timing>
+    <p:tnLst>
+      <p:par>
+        <p:cTn id="1" dur="indefinite" restart="never" nodeType="tmRoot"/>
+      </p:par>
+    </p:tnLst>
+  </p:timing>
+</p:sld>
+</file>
+
+<file path=ppt/slides/slide6.xml><?xml version="1.0" encoding="utf-8"?>
+<p:sld xmlns:a="http://schemas.openxmlformats.org/drawingml/2006/main" xmlns:r="http://schemas.openxmlformats.org/officeDocument/2006/relationships" xmlns:p="http://schemas.openxmlformats.org/presentationml/2006/main">
+  <p:cSld>
+    <p:spTree>
+      <p:nvGrpSpPr>
+        <p:cNvPr id="1" name=""/>
+        <p:cNvGrpSpPr/>
+        <p:nvPr/>
+      </p:nvGrpSpPr>
+      <p:grpSpPr>
+        <a:xfrm>
+          <a:off x="0" y="0"/>
+          <a:ext cx="0" cy="0"/>
+          <a:chOff x="0" y="0"/>
+          <a:chExt cx="0" cy="0"/>
+        </a:xfrm>
+      </p:grpSpPr>
+      <p:sp>
+        <p:nvSpPr>
+          <p:cNvPr id="2" name="Title 1"/>
+          <p:cNvSpPr>
+            <a:spLocks noGrp="1"/>
+          </p:cNvSpPr>
+          <p:nvPr>
+            <p:ph type="title"/>
+          </p:nvPr>
+        </p:nvSpPr>
+        <p:spPr/>
+        <p:txBody>
+          <a:bodyPr/>
+          <a:lstStyle/>
+          <a:p>
+            <a:r>
+              <a:rPr lang="en-US" dirty="0"/>
+              <a:t>Training and test set</a:t>
+            </a:r>
+            <a:endParaRPr lang="he-IL" dirty="0"/>
+          </a:p>
+        </p:txBody>
+      </p:sp>
+      <p:sp>
+        <p:nvSpPr>
+          <p:cNvPr id="4" name="Content Placeholder 2"/>
+          <p:cNvSpPr txBox="1">
+            <a:spLocks/>
+          </p:cNvSpPr>
+          <p:nvPr/>
+        </p:nvSpPr>
+        <p:spPr>
+          <a:xfrm>
+            <a:off x="1451579" y="2015732"/>
+            <a:ext cx="9603275" cy="3450613"/>
+          </a:xfrm>
+          <a:prstGeom prst="rect">
+            <a:avLst/>
+          </a:prstGeom>
+        </p:spPr>
+        <p:txBody>
+          <a:bodyPr/>
+          <a:lstStyle>
+            <a:lvl1pPr marL="228600" indent="-228600" algn="l" defTabSz="914400" rtl="0" eaLnBrk="1" latinLnBrk="0" hangingPunct="1">
+              <a:lnSpc>
+                <a:spcPct val="120000"/>
+              </a:lnSpc>
+              <a:spcBef>
+                <a:spcPts val="1000"/>
+              </a:spcBef>
+              <a:buClr>
+                <a:schemeClr val="accent1"/>
+              </a:buClr>
+              <a:buSzPct val="100000"/>
+              <a:buFont typeface="Arial" panose="020B0604020202020204" pitchFamily="34" charset="0"/>
+              <a:buChar char="•"/>
+              <a:defRPr sz="2000" kern="1200">
+                <a:solidFill>
+                  <a:schemeClr val="tx1"/>
+                </a:solidFill>
+                <a:effectLst/>
+                <a:latin typeface="+mn-lt"/>
+                <a:ea typeface="+mn-ea"/>
+                <a:cs typeface="+mn-cs"/>
+              </a:defRPr>
+            </a:lvl1pPr>
+            <a:lvl2pPr marL="685800" indent="-228600" algn="l" defTabSz="914400" rtl="0" eaLnBrk="1" latinLnBrk="0" hangingPunct="1">
+              <a:lnSpc>
+                <a:spcPct val="120000"/>
+              </a:lnSpc>
+              <a:spcBef>
+                <a:spcPts val="500"/>
+              </a:spcBef>
+              <a:buClr>
+                <a:schemeClr val="accent1"/>
+              </a:buClr>
+              <a:buSzPct val="100000"/>
+              <a:buFont typeface="Arial" panose="020B0604020202020204" pitchFamily="34" charset="0"/>
+              <a:buChar char="•"/>
+              <a:defRPr sz="1800" kern="1200" cap="none" baseline="0">
+                <a:solidFill>
+                  <a:schemeClr val="tx1"/>
+                </a:solidFill>
+                <a:effectLst/>
+                <a:latin typeface="+mn-lt"/>
+                <a:ea typeface="+mn-ea"/>
+                <a:cs typeface="+mn-cs"/>
+              </a:defRPr>
+            </a:lvl2pPr>
+            <a:lvl3pPr marL="1143000" indent="-228600" algn="l" defTabSz="914400" rtl="0" eaLnBrk="1" latinLnBrk="0" hangingPunct="1">
+              <a:lnSpc>
+                <a:spcPct val="120000"/>
+              </a:lnSpc>
+              <a:spcBef>
+                <a:spcPts val="500"/>
+              </a:spcBef>
+              <a:buClr>
+                <a:schemeClr val="accent1"/>
+              </a:buClr>
+              <a:buSzPct val="100000"/>
+              <a:buFont typeface="Arial" panose="020B0604020202020204" pitchFamily="34" charset="0"/>
+              <a:buChar char="•"/>
+              <a:defRPr sz="1600" kern="1200">
+                <a:solidFill>
+                  <a:schemeClr val="tx1"/>
+                </a:solidFill>
+                <a:effectLst/>
+                <a:latin typeface="+mn-lt"/>
+                <a:ea typeface="+mn-ea"/>
+                <a:cs typeface="+mn-cs"/>
+              </a:defRPr>
+            </a:lvl3pPr>
+            <a:lvl4pPr marL="1600200" indent="-228600" algn="l" defTabSz="914400" rtl="0" eaLnBrk="1" latinLnBrk="0" hangingPunct="1">
+              <a:lnSpc>
+                <a:spcPct val="120000"/>
+              </a:lnSpc>
+              <a:spcBef>
+                <a:spcPts val="500"/>
+              </a:spcBef>
+              <a:buClr>
+                <a:schemeClr val="accent1"/>
+              </a:buClr>
+              <a:buSzPct val="100000"/>
+              <a:buFont typeface="Arial" panose="020B0604020202020204" pitchFamily="34" charset="0"/>
+              <a:buChar char="•"/>
+              <a:defRPr sz="1400" kern="1200" cap="none" baseline="0">
+                <a:solidFill>
+                  <a:schemeClr val="tx1"/>
+                </a:solidFill>
+                <a:effectLst/>
+                <a:latin typeface="+mn-lt"/>
+                <a:ea typeface="+mn-ea"/>
+                <a:cs typeface="+mn-cs"/>
+              </a:defRPr>
+            </a:lvl4pPr>
+            <a:lvl5pPr marL="2057400" indent="-228600" algn="l" defTabSz="914400" rtl="0" eaLnBrk="1" latinLnBrk="0" hangingPunct="1">
+              <a:lnSpc>
+                <a:spcPct val="120000"/>
+              </a:lnSpc>
+              <a:spcBef>
+                <a:spcPts val="500"/>
+              </a:spcBef>
+              <a:buClr>
+                <a:schemeClr val="accent1"/>
+              </a:buClr>
+              <a:buSzPct val="100000"/>
+              <a:buFont typeface="Arial" panose="020B0604020202020204" pitchFamily="34" charset="0"/>
+              <a:buChar char="•"/>
+              <a:defRPr sz="1200" kern="1200">
+                <a:solidFill>
+                  <a:schemeClr val="tx1"/>
+                </a:solidFill>
+                <a:effectLst/>
+                <a:latin typeface="+mn-lt"/>
+                <a:ea typeface="+mn-ea"/>
+                <a:cs typeface="+mn-cs"/>
+              </a:defRPr>
+            </a:lvl5pPr>
+            <a:lvl6pPr marL="2514600" indent="-228600" algn="l" defTabSz="914400" rtl="0" eaLnBrk="1" latinLnBrk="0" hangingPunct="1">
+              <a:lnSpc>
+                <a:spcPct val="120000"/>
+              </a:lnSpc>
+              <a:spcBef>
+                <a:spcPts val="500"/>
+              </a:spcBef>
+              <a:buClr>
+                <a:schemeClr val="accent1"/>
+              </a:buClr>
+              <a:buSzPct val="100000"/>
+              <a:buFont typeface="Arial" panose="020B0604020202020204" pitchFamily="34" charset="0"/>
+              <a:buChar char="•"/>
+              <a:defRPr sz="1200" kern="1200">
+                <a:solidFill>
+                  <a:schemeClr val="tx1"/>
+                </a:solidFill>
+                <a:effectLst/>
+                <a:latin typeface="+mn-lt"/>
+                <a:ea typeface="+mn-ea"/>
+                <a:cs typeface="+mn-cs"/>
+              </a:defRPr>
+            </a:lvl6pPr>
+            <a:lvl7pPr marL="2971800" indent="-228600" algn="l" defTabSz="914400" rtl="0" eaLnBrk="1" latinLnBrk="0" hangingPunct="1">
+              <a:lnSpc>
+                <a:spcPct val="120000"/>
+              </a:lnSpc>
+              <a:spcBef>
+                <a:spcPts val="500"/>
+              </a:spcBef>
+              <a:buClr>
+                <a:schemeClr val="accent1"/>
+              </a:buClr>
+              <a:buSzPct val="100000"/>
+              <a:buFont typeface="Arial" panose="020B0604020202020204" pitchFamily="34" charset="0"/>
+              <a:buChar char="•"/>
+              <a:defRPr sz="1200" kern="1200">
+                <a:solidFill>
+                  <a:schemeClr val="tx1"/>
+                </a:solidFill>
+                <a:effectLst/>
+                <a:latin typeface="+mn-lt"/>
+                <a:ea typeface="+mn-ea"/>
+                <a:cs typeface="+mn-cs"/>
+              </a:defRPr>
+            </a:lvl7pPr>
+            <a:lvl8pPr marL="3429000" indent="-228600" algn="l" defTabSz="914400" rtl="0" eaLnBrk="1" latinLnBrk="0" hangingPunct="1">
+              <a:lnSpc>
+                <a:spcPct val="120000"/>
+              </a:lnSpc>
+              <a:spcBef>
+                <a:spcPts val="500"/>
+              </a:spcBef>
+              <a:buClr>
+                <a:schemeClr val="accent1"/>
+              </a:buClr>
+              <a:buSzPct val="100000"/>
+              <a:buFont typeface="Arial" panose="020B0604020202020204" pitchFamily="34" charset="0"/>
+              <a:buChar char="•"/>
+              <a:defRPr sz="1200" kern="1200" baseline="0">
+                <a:solidFill>
+                  <a:schemeClr val="tx1"/>
+                </a:solidFill>
+                <a:effectLst/>
+                <a:latin typeface="+mn-lt"/>
+                <a:ea typeface="+mn-ea"/>
+                <a:cs typeface="+mn-cs"/>
+              </a:defRPr>
+            </a:lvl8pPr>
+            <a:lvl9pPr marL="3886200" indent="-228600" algn="l" defTabSz="914400" rtl="0" eaLnBrk="1" latinLnBrk="0" hangingPunct="1">
+              <a:lnSpc>
+                <a:spcPct val="120000"/>
+              </a:lnSpc>
+              <a:spcBef>
+                <a:spcPts val="500"/>
+              </a:spcBef>
+              <a:buClr>
+                <a:schemeClr val="accent1"/>
+              </a:buClr>
+              <a:buSzPct val="100000"/>
+              <a:buFont typeface="Arial" panose="020B0604020202020204" pitchFamily="34" charset="0"/>
+              <a:buChar char="•"/>
+              <a:defRPr sz="1200" kern="1200" baseline="0">
+                <a:solidFill>
+                  <a:schemeClr val="tx1"/>
+                </a:solidFill>
+                <a:effectLst/>
+                <a:latin typeface="+mn-lt"/>
+                <a:ea typeface="+mn-ea"/>
+                <a:cs typeface="+mn-cs"/>
+              </a:defRPr>
+            </a:lvl9pPr>
+          </a:lstStyle>
+          <a:p>
+            <a:r>
+              <a:rPr lang="sv-SE" dirty="0"/>
+              <a:t>Data cleaning</a:t>
+            </a:r>
+          </a:p>
+          <a:p>
+            <a:r>
+              <a:rPr lang="sv-SE" dirty="0"/>
+              <a:t>200 floor plans</a:t>
+            </a:r>
+          </a:p>
+          <a:p>
+            <a:pPr lvl="1"/>
+            <a:r>
+              <a:rPr lang="sv-SE" dirty="0"/>
+              <a:t>1000 doors</a:t>
+            </a:r>
+          </a:p>
+          <a:p>
+            <a:pPr lvl="1"/>
+            <a:r>
+              <a:rPr lang="sv-SE" dirty="0"/>
+              <a:t>200 after cleaning</a:t>
+            </a:r>
+          </a:p>
+          <a:p>
+            <a:pPr lvl="1"/>
+            <a:r>
+              <a:rPr lang="sv-SE" dirty="0"/>
+              <a:t>~10000  doors after augmentation</a:t>
+            </a:r>
+          </a:p>
+          <a:p>
+            <a:pPr lvl="1"/>
+            <a:r>
+              <a:rPr lang="sv-SE" dirty="0"/>
+              <a:t>1000 non doors after cleaning</a:t>
+            </a:r>
+          </a:p>
+          <a:p>
+            <a:pPr lvl="1"/>
+            <a:r>
+              <a:rPr lang="sv-SE" dirty="0"/>
+              <a:t>~50000  non doors after augmentation </a:t>
+            </a:r>
+          </a:p>
+        </p:txBody>
+      </p:sp>
+      <p:pic>
+        <p:nvPicPr>
+          <p:cNvPr id="3074" name="Picture 2" descr="Image result for build plan"/>
+          <p:cNvPicPr>
+            <a:picLocks noChangeAspect="1" noChangeArrowheads="1"/>
+          </p:cNvPicPr>
+          <p:nvPr/>
+        </p:nvPicPr>
+        <p:blipFill>
+          <a:blip r:embed="rId2">
+            <a:clrChange>
+              <a:clrFrom>
+                <a:srgbClr val="FEFEFE"/>
+              </a:clrFrom>
+              <a:clrTo>
+                <a:srgbClr val="FEFEFE">
+                  <a:alpha val="0"/>
+                </a:srgbClr>
+              </a:clrTo>
+            </a:clrChange>
+            <a:extLst>
+              <a:ext uri="{28A0092B-C50C-407E-A947-70E740481C1C}">
+                <a14:useLocalDpi xmlns:a14="http://schemas.microsoft.com/office/drawing/2010/main" val="0"/>
+              </a:ext>
+            </a:extLst>
+          </a:blip>
+          <a:srcRect/>
+          <a:stretch>
+            <a:fillRect/>
+          </a:stretch>
+        </p:blipFill>
+        <p:spPr bwMode="auto">
+          <a:xfrm>
+            <a:off x="7372350" y="2015732"/>
+            <a:ext cx="4038600" cy="2886075"/>
+          </a:xfrm>
+          <a:prstGeom prst="rect">
+            <a:avLst/>
+          </a:prstGeom>
+          <a:noFill/>
+          <a:extLst>
+            <a:ext uri="{909E8E84-426E-40DD-AFC4-6F175D3DCCD1}">
+              <a14:hiddenFill xmlns:a14="http://schemas.microsoft.com/office/drawing/2010/main">
+                <a:solidFill>
+                  <a:srgbClr val="FFFFFF"/>
+                </a:solidFill>
+              </a14:hiddenFill>
+            </a:ext>
+          </a:extLst>
+        </p:spPr>
+      </p:pic>
+    </p:spTree>
+    <p:extLst>
+      <p:ext uri="{BB962C8B-B14F-4D97-AF65-F5344CB8AC3E}">
+        <p14:creationId xmlns:p14="http://schemas.microsoft.com/office/powerpoint/2010/main" val="1512997833"/>
+      </p:ext>
+    </p:extLst>
+  </p:cSld>
+  <p:clrMapOvr>
+    <a:masterClrMapping/>
+  </p:clrMapOvr>
+  <p:timing>
+    <p:tnLst>
+      <p:par>
+        <p:cTn id="1" dur="indefinite" restart="never" nodeType="tmRoot"/>
+      </p:par>
+    </p:tnLst>
+  </p:timing>
+</p:sld>
+</file>
+
+<file path=ppt/slides/slide7.xml><?xml version="1.0" encoding="utf-8"?>
+<p:sld xmlns:a="http://schemas.openxmlformats.org/drawingml/2006/main" xmlns:r="http://schemas.openxmlformats.org/officeDocument/2006/relationships" xmlns:p="http://schemas.openxmlformats.org/presentationml/2006/main">
+  <p:cSld>
+    <p:spTree>
+      <p:nvGrpSpPr>
+        <p:cNvPr id="1" name=""/>
+        <p:cNvGrpSpPr/>
+        <p:nvPr/>
+      </p:nvGrpSpPr>
+      <p:grpSpPr>
+        <a:xfrm>
+          <a:off x="0" y="0"/>
+          <a:ext cx="0" cy="0"/>
+          <a:chOff x="0" y="0"/>
+          <a:chExt cx="0" cy="0"/>
+        </a:xfrm>
+      </p:grpSpPr>
+      <p:sp>
+        <p:nvSpPr>
+          <p:cNvPr id="2" name="Title 1"/>
+          <p:cNvSpPr>
+            <a:spLocks noGrp="1"/>
+          </p:cNvSpPr>
+          <p:nvPr>
+            <p:ph type="title"/>
+          </p:nvPr>
+        </p:nvSpPr>
+        <p:spPr/>
+        <p:txBody>
+          <a:bodyPr/>
+          <a:lstStyle/>
+          <a:p>
+            <a:r>
+              <a:rPr lang="en-US" dirty="0"/>
+              <a:t>Solution</a:t>
+            </a:r>
+          </a:p>
+        </p:txBody>
+      </p:sp>
+      <p:sp>
+        <p:nvSpPr>
+          <p:cNvPr id="3" name="Content Placeholder 2"/>
+          <p:cNvSpPr>
+            <a:spLocks noGrp="1"/>
+          </p:cNvSpPr>
           <p:nvPr>
             <p:ph idx="1"/>
           </p:nvPr>
+        </p:nvSpPr>
+        <p:spPr/>
+        <p:txBody>
+          <a:bodyPr>
+            <a:normAutofit fontScale="92500" lnSpcReduction="10000"/>
+          </a:bodyPr>
+          <a:lstStyle/>
+          <a:p>
+            <a:r>
+              <a:rPr lang="en-US" dirty="0"/>
+              <a:t>Attempt 1: Direct Feature detection</a:t>
+            </a:r>
+          </a:p>
+          <a:p>
+            <a:pPr lvl="1"/>
+            <a:r>
+              <a:rPr lang="en-US" dirty="0"/>
+              <a:t>Circle Hough Transform</a:t>
+            </a:r>
+          </a:p>
+          <a:p>
+            <a:pPr lvl="1"/>
+            <a:r>
+              <a:rPr lang="en-US" dirty="0"/>
+              <a:t>Requires fine tuning</a:t>
+            </a:r>
+          </a:p>
+          <a:p>
+            <a:pPr lvl="1"/>
+            <a:r>
+              <a:rPr lang="en-US" dirty="0"/>
+              <a:t>Not feasible in 2 day limit</a:t>
+            </a:r>
+            <a:br>
+              <a:rPr lang="en-US" dirty="0"/>
+            </a:br>
+            <a:endParaRPr lang="en-US" dirty="0"/>
+          </a:p>
+          <a:p>
+            <a:r>
+              <a:rPr lang="en-US" dirty="0"/>
+              <a:t>Solution: Convolutional Neural Network learning solution</a:t>
+            </a:r>
+          </a:p>
+          <a:p>
+            <a:pPr lvl="1"/>
+            <a:r>
+              <a:rPr lang="en-US" dirty="0"/>
+              <a:t>Using sliding windows to perform detection</a:t>
+            </a:r>
+          </a:p>
+          <a:p>
+            <a:endParaRPr lang="en-US" dirty="0"/>
+          </a:p>
+          <a:p>
+            <a:r>
+              <a:rPr lang="en-US" dirty="0"/>
+              <a:t>Now in </a:t>
+            </a:r>
+            <a:r>
+              <a:rPr lang="en-US" dirty="0" err="1"/>
+              <a:t>Github</a:t>
+            </a:r>
+            <a:r>
+              <a:rPr lang="en-US" dirty="0"/>
+              <a:t>! </a:t>
+            </a:r>
+            <a:r>
+              <a:rPr lang="en-US" dirty="0">
+                <a:hlinkClick r:id="rId2"/>
+              </a:rPr>
+              <a:t>http://github.com/guysoft/thedoorks</a:t>
+            </a:r>
+            <a:endParaRPr lang="en-US" dirty="0"/>
+          </a:p>
+          <a:p>
+            <a:endParaRPr lang="en-US" dirty="0"/>
+          </a:p>
+        </p:txBody>
+      </p:sp>
+      <p:pic>
+        <p:nvPicPr>
+          <p:cNvPr id="5" name="Picture 4"/>
+          <p:cNvPicPr>
+            <a:picLocks noChangeAspect="1"/>
+          </p:cNvPicPr>
+          <p:nvPr/>
         </p:nvPicPr>
         <p:blipFill>
-          <a:blip r:embed="rId2">
+          <a:blip r:embed="rId3">
             <a:extLst>
               <a:ext uri="{28A0092B-C50C-407E-A947-70E740481C1C}">
                 <a14:useLocalDpi xmlns:a14="http://schemas.microsoft.com/office/drawing/2010/main" val="0"/>
@@ -5987,21 +7772,924 @@
         </p:blipFill>
         <p:spPr>
           <a:xfrm>
-            <a:off x="1977778" y="1853754"/>
-            <a:ext cx="6132689" cy="3449638"/>
+            <a:off x="5591228" y="1428132"/>
+            <a:ext cx="1323975" cy="2152650"/>
           </a:xfrm>
+          <a:prstGeom prst="rect">
+            <a:avLst/>
+          </a:prstGeom>
         </p:spPr>
       </p:pic>
-      <p:sp>
-        <p:nvSpPr>
-          <p:cNvPr id="5" name="TextBox 4"/>
+      <p:pic>
+        <p:nvPicPr>
+          <p:cNvPr id="6" name="Picture 4" descr="http://www.pyimagesearch.com/wp-content/uploads/2014/10/sliding_window_example.gif"/>
+          <p:cNvPicPr>
+            <a:picLocks noChangeAspect="1" noChangeArrowheads="1" noCrop="1"/>
+          </p:cNvPicPr>
+          <p:nvPr/>
+        </p:nvPicPr>
+        <p:blipFill>
+          <a:blip r:embed="rId4">
+            <a:extLst>
+              <a:ext uri="{28A0092B-C50C-407E-A947-70E740481C1C}">
+                <a14:useLocalDpi xmlns:a14="http://schemas.microsoft.com/office/drawing/2010/main" val="0"/>
+              </a:ext>
+            </a:extLst>
+          </a:blip>
+          <a:srcRect/>
+          <a:stretch>
+            <a:fillRect/>
+          </a:stretch>
+        </p:blipFill>
+        <p:spPr bwMode="auto">
+          <a:xfrm>
+            <a:off x="7526640" y="4227939"/>
+            <a:ext cx="1249714" cy="1840399"/>
+          </a:xfrm>
+          <a:prstGeom prst="rect">
+            <a:avLst/>
+          </a:prstGeom>
+          <a:noFill/>
+          <a:extLst>
+            <a:ext uri="{909E8E84-426E-40DD-AFC4-6F175D3DCCD1}">
+              <a14:hiddenFill xmlns:a14="http://schemas.microsoft.com/office/drawing/2010/main">
+                <a:solidFill>
+                  <a:srgbClr val="FFFFFF"/>
+                </a:solidFill>
+              </a14:hiddenFill>
+            </a:ext>
+          </a:extLst>
+        </p:spPr>
+      </p:pic>
+    </p:spTree>
+    <p:extLst>
+      <p:ext uri="{BB962C8B-B14F-4D97-AF65-F5344CB8AC3E}">
+        <p14:creationId xmlns:p14="http://schemas.microsoft.com/office/powerpoint/2010/main" val="2624435217"/>
+      </p:ext>
+    </p:extLst>
+  </p:cSld>
+  <p:clrMapOvr>
+    <a:masterClrMapping/>
+  </p:clrMapOvr>
+  <p:timing>
+    <p:tnLst>
+      <p:par>
+        <p:cTn id="1" dur="indefinite" restart="never" nodeType="tmRoot">
+          <p:childTnLst>
+            <p:seq concurrent="1" nextAc="seek">
+              <p:cTn id="2" dur="indefinite" nodeType="mainSeq">
+                <p:childTnLst>
+                  <p:par>
+                    <p:cTn id="3" fill="hold">
+                      <p:stCondLst>
+                        <p:cond delay="indefinite"/>
+                      </p:stCondLst>
+                      <p:childTnLst>
+                        <p:par>
+                          <p:cTn id="4" fill="hold">
+                            <p:stCondLst>
+                              <p:cond delay="0"/>
+                            </p:stCondLst>
+                            <p:childTnLst>
+                              <p:par>
+                                <p:cTn id="5" presetID="2" presetClass="entr" presetSubtype="4" fill="hold" nodeType="clickEffect">
+                                  <p:stCondLst>
+                                    <p:cond delay="0"/>
+                                  </p:stCondLst>
+                                  <p:childTnLst>
+                                    <p:set>
+                                      <p:cBhvr>
+                                        <p:cTn id="6" dur="1" fill="hold">
+                                          <p:stCondLst>
+                                            <p:cond delay="0"/>
+                                          </p:stCondLst>
+                                        </p:cTn>
+                                        <p:tgtEl>
+                                          <p:spTgt spid="3">
+                                            <p:txEl>
+                                              <p:pRg st="0" end="0"/>
+                                            </p:txEl>
+                                          </p:spTgt>
+                                        </p:tgtEl>
+                                        <p:attrNameLst>
+                                          <p:attrName>style.visibility</p:attrName>
+                                        </p:attrNameLst>
+                                      </p:cBhvr>
+                                      <p:to>
+                                        <p:strVal val="visible"/>
+                                      </p:to>
+                                    </p:set>
+                                    <p:anim calcmode="lin" valueType="num">
+                                      <p:cBhvr additive="base">
+                                        <p:cTn id="7" dur="500" fill="hold"/>
+                                        <p:tgtEl>
+                                          <p:spTgt spid="3">
+                                            <p:txEl>
+                                              <p:pRg st="0" end="0"/>
+                                            </p:txEl>
+                                          </p:spTgt>
+                                        </p:tgtEl>
+                                        <p:attrNameLst>
+                                          <p:attrName>ppt_x</p:attrName>
+                                        </p:attrNameLst>
+                                      </p:cBhvr>
+                                      <p:tavLst>
+                                        <p:tav tm="0">
+                                          <p:val>
+                                            <p:strVal val="#ppt_x"/>
+                                          </p:val>
+                                        </p:tav>
+                                        <p:tav tm="100000">
+                                          <p:val>
+                                            <p:strVal val="#ppt_x"/>
+                                          </p:val>
+                                        </p:tav>
+                                      </p:tavLst>
+                                    </p:anim>
+                                    <p:anim calcmode="lin" valueType="num">
+                                      <p:cBhvr additive="base">
+                                        <p:cTn id="8" dur="500" fill="hold"/>
+                                        <p:tgtEl>
+                                          <p:spTgt spid="3">
+                                            <p:txEl>
+                                              <p:pRg st="0" end="0"/>
+                                            </p:txEl>
+                                          </p:spTgt>
+                                        </p:tgtEl>
+                                        <p:attrNameLst>
+                                          <p:attrName>ppt_y</p:attrName>
+                                        </p:attrNameLst>
+                                      </p:cBhvr>
+                                      <p:tavLst>
+                                        <p:tav tm="0">
+                                          <p:val>
+                                            <p:strVal val="1+#ppt_h/2"/>
+                                          </p:val>
+                                        </p:tav>
+                                        <p:tav tm="100000">
+                                          <p:val>
+                                            <p:strVal val="#ppt_y"/>
+                                          </p:val>
+                                        </p:tav>
+                                      </p:tavLst>
+                                    </p:anim>
+                                  </p:childTnLst>
+                                </p:cTn>
+                              </p:par>
+                              <p:par>
+                                <p:cTn id="9" presetID="2" presetClass="entr" presetSubtype="4" fill="hold" nodeType="withEffect">
+                                  <p:stCondLst>
+                                    <p:cond delay="0"/>
+                                  </p:stCondLst>
+                                  <p:childTnLst>
+                                    <p:set>
+                                      <p:cBhvr>
+                                        <p:cTn id="10" dur="1" fill="hold">
+                                          <p:stCondLst>
+                                            <p:cond delay="0"/>
+                                          </p:stCondLst>
+                                        </p:cTn>
+                                        <p:tgtEl>
+                                          <p:spTgt spid="3">
+                                            <p:txEl>
+                                              <p:pRg st="1" end="1"/>
+                                            </p:txEl>
+                                          </p:spTgt>
+                                        </p:tgtEl>
+                                        <p:attrNameLst>
+                                          <p:attrName>style.visibility</p:attrName>
+                                        </p:attrNameLst>
+                                      </p:cBhvr>
+                                      <p:to>
+                                        <p:strVal val="visible"/>
+                                      </p:to>
+                                    </p:set>
+                                    <p:anim calcmode="lin" valueType="num">
+                                      <p:cBhvr additive="base">
+                                        <p:cTn id="11" dur="500" fill="hold"/>
+                                        <p:tgtEl>
+                                          <p:spTgt spid="3">
+                                            <p:txEl>
+                                              <p:pRg st="1" end="1"/>
+                                            </p:txEl>
+                                          </p:spTgt>
+                                        </p:tgtEl>
+                                        <p:attrNameLst>
+                                          <p:attrName>ppt_x</p:attrName>
+                                        </p:attrNameLst>
+                                      </p:cBhvr>
+                                      <p:tavLst>
+                                        <p:tav tm="0">
+                                          <p:val>
+                                            <p:strVal val="#ppt_x"/>
+                                          </p:val>
+                                        </p:tav>
+                                        <p:tav tm="100000">
+                                          <p:val>
+                                            <p:strVal val="#ppt_x"/>
+                                          </p:val>
+                                        </p:tav>
+                                      </p:tavLst>
+                                    </p:anim>
+                                    <p:anim calcmode="lin" valueType="num">
+                                      <p:cBhvr additive="base">
+                                        <p:cTn id="12" dur="500" fill="hold"/>
+                                        <p:tgtEl>
+                                          <p:spTgt spid="3">
+                                            <p:txEl>
+                                              <p:pRg st="1" end="1"/>
+                                            </p:txEl>
+                                          </p:spTgt>
+                                        </p:tgtEl>
+                                        <p:attrNameLst>
+                                          <p:attrName>ppt_y</p:attrName>
+                                        </p:attrNameLst>
+                                      </p:cBhvr>
+                                      <p:tavLst>
+                                        <p:tav tm="0">
+                                          <p:val>
+                                            <p:strVal val="1+#ppt_h/2"/>
+                                          </p:val>
+                                        </p:tav>
+                                        <p:tav tm="100000">
+                                          <p:val>
+                                            <p:strVal val="#ppt_y"/>
+                                          </p:val>
+                                        </p:tav>
+                                      </p:tavLst>
+                                    </p:anim>
+                                  </p:childTnLst>
+                                </p:cTn>
+                              </p:par>
+                              <p:par>
+                                <p:cTn id="13" presetID="2" presetClass="entr" presetSubtype="4" fill="hold" nodeType="withEffect">
+                                  <p:stCondLst>
+                                    <p:cond delay="0"/>
+                                  </p:stCondLst>
+                                  <p:childTnLst>
+                                    <p:set>
+                                      <p:cBhvr>
+                                        <p:cTn id="14" dur="1" fill="hold">
+                                          <p:stCondLst>
+                                            <p:cond delay="0"/>
+                                          </p:stCondLst>
+                                        </p:cTn>
+                                        <p:tgtEl>
+                                          <p:spTgt spid="3">
+                                            <p:txEl>
+                                              <p:pRg st="2" end="2"/>
+                                            </p:txEl>
+                                          </p:spTgt>
+                                        </p:tgtEl>
+                                        <p:attrNameLst>
+                                          <p:attrName>style.visibility</p:attrName>
+                                        </p:attrNameLst>
+                                      </p:cBhvr>
+                                      <p:to>
+                                        <p:strVal val="visible"/>
+                                      </p:to>
+                                    </p:set>
+                                    <p:anim calcmode="lin" valueType="num">
+                                      <p:cBhvr additive="base">
+                                        <p:cTn id="15" dur="500" fill="hold"/>
+                                        <p:tgtEl>
+                                          <p:spTgt spid="3">
+                                            <p:txEl>
+                                              <p:pRg st="2" end="2"/>
+                                            </p:txEl>
+                                          </p:spTgt>
+                                        </p:tgtEl>
+                                        <p:attrNameLst>
+                                          <p:attrName>ppt_x</p:attrName>
+                                        </p:attrNameLst>
+                                      </p:cBhvr>
+                                      <p:tavLst>
+                                        <p:tav tm="0">
+                                          <p:val>
+                                            <p:strVal val="#ppt_x"/>
+                                          </p:val>
+                                        </p:tav>
+                                        <p:tav tm="100000">
+                                          <p:val>
+                                            <p:strVal val="#ppt_x"/>
+                                          </p:val>
+                                        </p:tav>
+                                      </p:tavLst>
+                                    </p:anim>
+                                    <p:anim calcmode="lin" valueType="num">
+                                      <p:cBhvr additive="base">
+                                        <p:cTn id="16" dur="500" fill="hold"/>
+                                        <p:tgtEl>
+                                          <p:spTgt spid="3">
+                                            <p:txEl>
+                                              <p:pRg st="2" end="2"/>
+                                            </p:txEl>
+                                          </p:spTgt>
+                                        </p:tgtEl>
+                                        <p:attrNameLst>
+                                          <p:attrName>ppt_y</p:attrName>
+                                        </p:attrNameLst>
+                                      </p:cBhvr>
+                                      <p:tavLst>
+                                        <p:tav tm="0">
+                                          <p:val>
+                                            <p:strVal val="1+#ppt_h/2"/>
+                                          </p:val>
+                                        </p:tav>
+                                        <p:tav tm="100000">
+                                          <p:val>
+                                            <p:strVal val="#ppt_y"/>
+                                          </p:val>
+                                        </p:tav>
+                                      </p:tavLst>
+                                    </p:anim>
+                                  </p:childTnLst>
+                                </p:cTn>
+                              </p:par>
+                              <p:par>
+                                <p:cTn id="17" presetID="2" presetClass="entr" presetSubtype="4" fill="hold" nodeType="withEffect">
+                                  <p:stCondLst>
+                                    <p:cond delay="0"/>
+                                  </p:stCondLst>
+                                  <p:childTnLst>
+                                    <p:set>
+                                      <p:cBhvr>
+                                        <p:cTn id="18" dur="1" fill="hold">
+                                          <p:stCondLst>
+                                            <p:cond delay="0"/>
+                                          </p:stCondLst>
+                                        </p:cTn>
+                                        <p:tgtEl>
+                                          <p:spTgt spid="3">
+                                            <p:txEl>
+                                              <p:pRg st="3" end="3"/>
+                                            </p:txEl>
+                                          </p:spTgt>
+                                        </p:tgtEl>
+                                        <p:attrNameLst>
+                                          <p:attrName>style.visibility</p:attrName>
+                                        </p:attrNameLst>
+                                      </p:cBhvr>
+                                      <p:to>
+                                        <p:strVal val="visible"/>
+                                      </p:to>
+                                    </p:set>
+                                    <p:anim calcmode="lin" valueType="num">
+                                      <p:cBhvr additive="base">
+                                        <p:cTn id="19" dur="500" fill="hold"/>
+                                        <p:tgtEl>
+                                          <p:spTgt spid="3">
+                                            <p:txEl>
+                                              <p:pRg st="3" end="3"/>
+                                            </p:txEl>
+                                          </p:spTgt>
+                                        </p:tgtEl>
+                                        <p:attrNameLst>
+                                          <p:attrName>ppt_x</p:attrName>
+                                        </p:attrNameLst>
+                                      </p:cBhvr>
+                                      <p:tavLst>
+                                        <p:tav tm="0">
+                                          <p:val>
+                                            <p:strVal val="#ppt_x"/>
+                                          </p:val>
+                                        </p:tav>
+                                        <p:tav tm="100000">
+                                          <p:val>
+                                            <p:strVal val="#ppt_x"/>
+                                          </p:val>
+                                        </p:tav>
+                                      </p:tavLst>
+                                    </p:anim>
+                                    <p:anim calcmode="lin" valueType="num">
+                                      <p:cBhvr additive="base">
+                                        <p:cTn id="20" dur="500" fill="hold"/>
+                                        <p:tgtEl>
+                                          <p:spTgt spid="3">
+                                            <p:txEl>
+                                              <p:pRg st="3" end="3"/>
+                                            </p:txEl>
+                                          </p:spTgt>
+                                        </p:tgtEl>
+                                        <p:attrNameLst>
+                                          <p:attrName>ppt_y</p:attrName>
+                                        </p:attrNameLst>
+                                      </p:cBhvr>
+                                      <p:tavLst>
+                                        <p:tav tm="0">
+                                          <p:val>
+                                            <p:strVal val="1+#ppt_h/2"/>
+                                          </p:val>
+                                        </p:tav>
+                                        <p:tav tm="100000">
+                                          <p:val>
+                                            <p:strVal val="#ppt_y"/>
+                                          </p:val>
+                                        </p:tav>
+                                      </p:tavLst>
+                                    </p:anim>
+                                  </p:childTnLst>
+                                </p:cTn>
+                              </p:par>
+                              <p:par>
+                                <p:cTn id="21" presetID="14" presetClass="entr" presetSubtype="10" fill="hold" nodeType="withEffect">
+                                  <p:stCondLst>
+                                    <p:cond delay="0"/>
+                                  </p:stCondLst>
+                                  <p:childTnLst>
+                                    <p:set>
+                                      <p:cBhvr>
+                                        <p:cTn id="22" dur="1" fill="hold">
+                                          <p:stCondLst>
+                                            <p:cond delay="0"/>
+                                          </p:stCondLst>
+                                        </p:cTn>
+                                        <p:tgtEl>
+                                          <p:spTgt spid="5"/>
+                                        </p:tgtEl>
+                                        <p:attrNameLst>
+                                          <p:attrName>style.visibility</p:attrName>
+                                        </p:attrNameLst>
+                                      </p:cBhvr>
+                                      <p:to>
+                                        <p:strVal val="visible"/>
+                                      </p:to>
+                                    </p:set>
+                                    <p:animEffect transition="in" filter="randombar(horizontal)">
+                                      <p:cBhvr>
+                                        <p:cTn id="23" dur="500"/>
+                                        <p:tgtEl>
+                                          <p:spTgt spid="5"/>
+                                        </p:tgtEl>
+                                      </p:cBhvr>
+                                    </p:animEffect>
+                                  </p:childTnLst>
+                                </p:cTn>
+                              </p:par>
+                            </p:childTnLst>
+                          </p:cTn>
+                        </p:par>
+                      </p:childTnLst>
+                    </p:cTn>
+                  </p:par>
+                  <p:par>
+                    <p:cTn id="24" fill="hold">
+                      <p:stCondLst>
+                        <p:cond delay="indefinite"/>
+                      </p:stCondLst>
+                      <p:childTnLst>
+                        <p:par>
+                          <p:cTn id="25" fill="hold">
+                            <p:stCondLst>
+                              <p:cond delay="0"/>
+                            </p:stCondLst>
+                            <p:childTnLst>
+                              <p:par>
+                                <p:cTn id="26" presetID="2" presetClass="entr" presetSubtype="4" fill="hold" nodeType="clickEffect">
+                                  <p:stCondLst>
+                                    <p:cond delay="0"/>
+                                  </p:stCondLst>
+                                  <p:childTnLst>
+                                    <p:set>
+                                      <p:cBhvr>
+                                        <p:cTn id="27" dur="1" fill="hold">
+                                          <p:stCondLst>
+                                            <p:cond delay="0"/>
+                                          </p:stCondLst>
+                                        </p:cTn>
+                                        <p:tgtEl>
+                                          <p:spTgt spid="3">
+                                            <p:txEl>
+                                              <p:pRg st="4" end="4"/>
+                                            </p:txEl>
+                                          </p:spTgt>
+                                        </p:tgtEl>
+                                        <p:attrNameLst>
+                                          <p:attrName>style.visibility</p:attrName>
+                                        </p:attrNameLst>
+                                      </p:cBhvr>
+                                      <p:to>
+                                        <p:strVal val="visible"/>
+                                      </p:to>
+                                    </p:set>
+                                    <p:anim calcmode="lin" valueType="num">
+                                      <p:cBhvr additive="base">
+                                        <p:cTn id="28" dur="500" fill="hold"/>
+                                        <p:tgtEl>
+                                          <p:spTgt spid="3">
+                                            <p:txEl>
+                                              <p:pRg st="4" end="4"/>
+                                            </p:txEl>
+                                          </p:spTgt>
+                                        </p:tgtEl>
+                                        <p:attrNameLst>
+                                          <p:attrName>ppt_x</p:attrName>
+                                        </p:attrNameLst>
+                                      </p:cBhvr>
+                                      <p:tavLst>
+                                        <p:tav tm="0">
+                                          <p:val>
+                                            <p:strVal val="#ppt_x"/>
+                                          </p:val>
+                                        </p:tav>
+                                        <p:tav tm="100000">
+                                          <p:val>
+                                            <p:strVal val="#ppt_x"/>
+                                          </p:val>
+                                        </p:tav>
+                                      </p:tavLst>
+                                    </p:anim>
+                                    <p:anim calcmode="lin" valueType="num">
+                                      <p:cBhvr additive="base">
+                                        <p:cTn id="29" dur="500" fill="hold"/>
+                                        <p:tgtEl>
+                                          <p:spTgt spid="3">
+                                            <p:txEl>
+                                              <p:pRg st="4" end="4"/>
+                                            </p:txEl>
+                                          </p:spTgt>
+                                        </p:tgtEl>
+                                        <p:attrNameLst>
+                                          <p:attrName>ppt_y</p:attrName>
+                                        </p:attrNameLst>
+                                      </p:cBhvr>
+                                      <p:tavLst>
+                                        <p:tav tm="0">
+                                          <p:val>
+                                            <p:strVal val="1+#ppt_h/2"/>
+                                          </p:val>
+                                        </p:tav>
+                                        <p:tav tm="100000">
+                                          <p:val>
+                                            <p:strVal val="#ppt_y"/>
+                                          </p:val>
+                                        </p:tav>
+                                      </p:tavLst>
+                                    </p:anim>
+                                  </p:childTnLst>
+                                </p:cTn>
+                              </p:par>
+                              <p:par>
+                                <p:cTn id="30" presetID="2" presetClass="entr" presetSubtype="4" fill="hold" nodeType="withEffect">
+                                  <p:stCondLst>
+                                    <p:cond delay="0"/>
+                                  </p:stCondLst>
+                                  <p:childTnLst>
+                                    <p:set>
+                                      <p:cBhvr>
+                                        <p:cTn id="31" dur="1" fill="hold">
+                                          <p:stCondLst>
+                                            <p:cond delay="0"/>
+                                          </p:stCondLst>
+                                        </p:cTn>
+                                        <p:tgtEl>
+                                          <p:spTgt spid="3">
+                                            <p:txEl>
+                                              <p:pRg st="5" end="5"/>
+                                            </p:txEl>
+                                          </p:spTgt>
+                                        </p:tgtEl>
+                                        <p:attrNameLst>
+                                          <p:attrName>style.visibility</p:attrName>
+                                        </p:attrNameLst>
+                                      </p:cBhvr>
+                                      <p:to>
+                                        <p:strVal val="visible"/>
+                                      </p:to>
+                                    </p:set>
+                                    <p:anim calcmode="lin" valueType="num">
+                                      <p:cBhvr additive="base">
+                                        <p:cTn id="32" dur="500" fill="hold"/>
+                                        <p:tgtEl>
+                                          <p:spTgt spid="3">
+                                            <p:txEl>
+                                              <p:pRg st="5" end="5"/>
+                                            </p:txEl>
+                                          </p:spTgt>
+                                        </p:tgtEl>
+                                        <p:attrNameLst>
+                                          <p:attrName>ppt_x</p:attrName>
+                                        </p:attrNameLst>
+                                      </p:cBhvr>
+                                      <p:tavLst>
+                                        <p:tav tm="0">
+                                          <p:val>
+                                            <p:strVal val="#ppt_x"/>
+                                          </p:val>
+                                        </p:tav>
+                                        <p:tav tm="100000">
+                                          <p:val>
+                                            <p:strVal val="#ppt_x"/>
+                                          </p:val>
+                                        </p:tav>
+                                      </p:tavLst>
+                                    </p:anim>
+                                    <p:anim calcmode="lin" valueType="num">
+                                      <p:cBhvr additive="base">
+                                        <p:cTn id="33" dur="500" fill="hold"/>
+                                        <p:tgtEl>
+                                          <p:spTgt spid="3">
+                                            <p:txEl>
+                                              <p:pRg st="5" end="5"/>
+                                            </p:txEl>
+                                          </p:spTgt>
+                                        </p:tgtEl>
+                                        <p:attrNameLst>
+                                          <p:attrName>ppt_y</p:attrName>
+                                        </p:attrNameLst>
+                                      </p:cBhvr>
+                                      <p:tavLst>
+                                        <p:tav tm="0">
+                                          <p:val>
+                                            <p:strVal val="1+#ppt_h/2"/>
+                                          </p:val>
+                                        </p:tav>
+                                        <p:tav tm="100000">
+                                          <p:val>
+                                            <p:strVal val="#ppt_y"/>
+                                          </p:val>
+                                        </p:tav>
+                                      </p:tavLst>
+                                    </p:anim>
+                                  </p:childTnLst>
+                                </p:cTn>
+                              </p:par>
+                              <p:par>
+                                <p:cTn id="34" presetID="14" presetClass="entr" presetSubtype="10" fill="hold" nodeType="withEffect">
+                                  <p:stCondLst>
+                                    <p:cond delay="0"/>
+                                  </p:stCondLst>
+                                  <p:childTnLst>
+                                    <p:set>
+                                      <p:cBhvr>
+                                        <p:cTn id="35" dur="1" fill="hold">
+                                          <p:stCondLst>
+                                            <p:cond delay="0"/>
+                                          </p:stCondLst>
+                                        </p:cTn>
+                                        <p:tgtEl>
+                                          <p:spTgt spid="6"/>
+                                        </p:tgtEl>
+                                        <p:attrNameLst>
+                                          <p:attrName>style.visibility</p:attrName>
+                                        </p:attrNameLst>
+                                      </p:cBhvr>
+                                      <p:to>
+                                        <p:strVal val="visible"/>
+                                      </p:to>
+                                    </p:set>
+                                    <p:animEffect transition="in" filter="randombar(horizontal)">
+                                      <p:cBhvr>
+                                        <p:cTn id="36" dur="500"/>
+                                        <p:tgtEl>
+                                          <p:spTgt spid="6"/>
+                                        </p:tgtEl>
+                                      </p:cBhvr>
+                                    </p:animEffect>
+                                  </p:childTnLst>
+                                </p:cTn>
+                              </p:par>
+                            </p:childTnLst>
+                          </p:cTn>
+                        </p:par>
+                      </p:childTnLst>
+                    </p:cTn>
+                  </p:par>
+                  <p:par>
+                    <p:cTn id="37" fill="hold">
+                      <p:stCondLst>
+                        <p:cond delay="indefinite"/>
+                      </p:stCondLst>
+                      <p:childTnLst>
+                        <p:par>
+                          <p:cTn id="38" fill="hold">
+                            <p:stCondLst>
+                              <p:cond delay="0"/>
+                            </p:stCondLst>
+                            <p:childTnLst>
+                              <p:par>
+                                <p:cTn id="39" presetID="2" presetClass="entr" presetSubtype="4" fill="hold" nodeType="clickEffect">
+                                  <p:stCondLst>
+                                    <p:cond delay="0"/>
+                                  </p:stCondLst>
+                                  <p:childTnLst>
+                                    <p:set>
+                                      <p:cBhvr>
+                                        <p:cTn id="40" dur="1" fill="hold">
+                                          <p:stCondLst>
+                                            <p:cond delay="0"/>
+                                          </p:stCondLst>
+                                        </p:cTn>
+                                        <p:tgtEl>
+                                          <p:spTgt spid="3">
+                                            <p:txEl>
+                                              <p:pRg st="7" end="7"/>
+                                            </p:txEl>
+                                          </p:spTgt>
+                                        </p:tgtEl>
+                                        <p:attrNameLst>
+                                          <p:attrName>style.visibility</p:attrName>
+                                        </p:attrNameLst>
+                                      </p:cBhvr>
+                                      <p:to>
+                                        <p:strVal val="visible"/>
+                                      </p:to>
+                                    </p:set>
+                                    <p:anim calcmode="lin" valueType="num">
+                                      <p:cBhvr additive="base">
+                                        <p:cTn id="41" dur="500" fill="hold"/>
+                                        <p:tgtEl>
+                                          <p:spTgt spid="3">
+                                            <p:txEl>
+                                              <p:pRg st="7" end="7"/>
+                                            </p:txEl>
+                                          </p:spTgt>
+                                        </p:tgtEl>
+                                        <p:attrNameLst>
+                                          <p:attrName>ppt_x</p:attrName>
+                                        </p:attrNameLst>
+                                      </p:cBhvr>
+                                      <p:tavLst>
+                                        <p:tav tm="0">
+                                          <p:val>
+                                            <p:strVal val="#ppt_x"/>
+                                          </p:val>
+                                        </p:tav>
+                                        <p:tav tm="100000">
+                                          <p:val>
+                                            <p:strVal val="#ppt_x"/>
+                                          </p:val>
+                                        </p:tav>
+                                      </p:tavLst>
+                                    </p:anim>
+                                    <p:anim calcmode="lin" valueType="num">
+                                      <p:cBhvr additive="base">
+                                        <p:cTn id="42" dur="500" fill="hold"/>
+                                        <p:tgtEl>
+                                          <p:spTgt spid="3">
+                                            <p:txEl>
+                                              <p:pRg st="7" end="7"/>
+                                            </p:txEl>
+                                          </p:spTgt>
+                                        </p:tgtEl>
+                                        <p:attrNameLst>
+                                          <p:attrName>ppt_y</p:attrName>
+                                        </p:attrNameLst>
+                                      </p:cBhvr>
+                                      <p:tavLst>
+                                        <p:tav tm="0">
+                                          <p:val>
+                                            <p:strVal val="1+#ppt_h/2"/>
+                                          </p:val>
+                                        </p:tav>
+                                        <p:tav tm="100000">
+                                          <p:val>
+                                            <p:strVal val="#ppt_y"/>
+                                          </p:val>
+                                        </p:tav>
+                                      </p:tavLst>
+                                    </p:anim>
+                                  </p:childTnLst>
+                                </p:cTn>
+                              </p:par>
+                            </p:childTnLst>
+                          </p:cTn>
+                        </p:par>
+                      </p:childTnLst>
+                    </p:cTn>
+                  </p:par>
+                </p:childTnLst>
+              </p:cTn>
+              <p:prevCondLst>
+                <p:cond evt="onPrev" delay="0">
+                  <p:tgtEl>
+                    <p:sldTgt/>
+                  </p:tgtEl>
+                </p:cond>
+              </p:prevCondLst>
+              <p:nextCondLst>
+                <p:cond evt="onNext" delay="0">
+                  <p:tgtEl>
+                    <p:sldTgt/>
+                  </p:tgtEl>
+                </p:cond>
+              </p:nextCondLst>
+            </p:seq>
+          </p:childTnLst>
+        </p:cTn>
+      </p:par>
+    </p:tnLst>
+  </p:timing>
+</p:sld>
+</file>
+
+<file path=ppt/slides/slide8.xml><?xml version="1.0" encoding="utf-8"?>
+<p:sld xmlns:a="http://schemas.openxmlformats.org/drawingml/2006/main" xmlns:r="http://schemas.openxmlformats.org/officeDocument/2006/relationships" xmlns:p="http://schemas.openxmlformats.org/presentationml/2006/main">
+  <p:cSld>
+    <p:spTree>
+      <p:nvGrpSpPr>
+        <p:cNvPr id="1" name=""/>
+        <p:cNvGrpSpPr/>
+        <p:nvPr/>
+      </p:nvGrpSpPr>
+      <p:grpSpPr>
+        <a:xfrm>
+          <a:off x="0" y="0"/>
+          <a:ext cx="0" cy="0"/>
+          <a:chOff x="0" y="0"/>
+          <a:chExt cx="0" cy="0"/>
+        </a:xfrm>
+      </p:grpSpPr>
+      <p:sp>
+        <p:nvSpPr>
+          <p:cNvPr id="2" name="Title 1"/>
+          <p:cNvSpPr>
+            <a:spLocks noGrp="1"/>
+          </p:cNvSpPr>
+          <p:nvPr>
+            <p:ph type="title"/>
+          </p:nvPr>
+        </p:nvSpPr>
+        <p:spPr/>
+        <p:txBody>
+          <a:bodyPr/>
+          <a:lstStyle/>
+          <a:p>
+            <a:r>
+              <a:rPr lang="en-US" dirty="0"/>
+              <a:t>Results</a:t>
+            </a:r>
+            <a:endParaRPr lang="he-IL" dirty="0"/>
+          </a:p>
+        </p:txBody>
+      </p:sp>
+      <p:sp>
+        <p:nvSpPr>
+          <p:cNvPr id="3" name="Content Placeholder 2"/>
+          <p:cNvSpPr>
+            <a:spLocks noGrp="1"/>
+          </p:cNvSpPr>
+          <p:nvPr>
+            <p:ph idx="1"/>
+          </p:nvPr>
+        </p:nvSpPr>
+        <p:spPr/>
+        <p:txBody>
+          <a:bodyPr/>
+          <a:lstStyle/>
+          <a:p>
+            <a:r>
+              <a:rPr lang="sv-SE" dirty="0"/>
+              <a:t>Training:</a:t>
+            </a:r>
+          </a:p>
+          <a:p>
+            <a:pPr lvl="1"/>
+            <a:r>
+              <a:rPr lang="sv-SE" dirty="0"/>
+              <a:t>loss: 0.1636 </a:t>
+            </a:r>
+          </a:p>
+          <a:p>
+            <a:pPr lvl="1"/>
+            <a:r>
+              <a:rPr lang="sv-SE" dirty="0"/>
+              <a:t>acc: 0.9565 </a:t>
+            </a:r>
+          </a:p>
+          <a:p>
+            <a:r>
+              <a:rPr lang="sv-SE" dirty="0"/>
+              <a:t>Validation:</a:t>
+            </a:r>
+          </a:p>
+          <a:p>
+            <a:pPr lvl="1"/>
+            <a:r>
+              <a:rPr lang="sv-SE" dirty="0"/>
+              <a:t>loss: 0.1765</a:t>
+            </a:r>
+          </a:p>
+          <a:p>
+            <a:pPr lvl="1"/>
+            <a:r>
+              <a:rPr lang="sv-SE" dirty="0"/>
+              <a:t>acc: 0.9409</a:t>
+            </a:r>
+            <a:endParaRPr lang="he-IL" dirty="0"/>
+          </a:p>
+        </p:txBody>
+      </p:sp>
+      <p:sp>
+        <p:nvSpPr>
+          <p:cNvPr id="4" name="TextBox 3"/>
           <p:cNvSpPr txBox="1"/>
           <p:nvPr/>
         </p:nvSpPr>
         <p:spPr>
-          <a:xfrm>
-            <a:off x="3058160" y="2258193"/>
-            <a:ext cx="1513840" cy="369332"/>
+          <a:xfrm rot="19574530">
+            <a:off x="4724400" y="1534155"/>
+            <a:ext cx="6819900" cy="1446550"/>
           </a:xfrm>
           <a:prstGeom prst="rect">
             <a:avLst/>
@@ -6015,168 +8703,12 @@
           <a:lstStyle/>
           <a:p>
             <a:r>
-              <a:rPr lang="en-US" dirty="0" err="1"/>
-              <a:t>Liat</a:t>
-            </a:r>
-            <a:endParaRPr lang="en-US" dirty="0"/>
-          </a:p>
-        </p:txBody>
-      </p:sp>
-      <p:sp>
-        <p:nvSpPr>
-          <p:cNvPr id="6" name="TextBox 5"/>
-          <p:cNvSpPr txBox="1"/>
-          <p:nvPr/>
-        </p:nvSpPr>
-        <p:spPr>
-          <a:xfrm>
-            <a:off x="4206240" y="1853754"/>
-            <a:ext cx="1513840" cy="369332"/>
-          </a:xfrm>
-          <a:prstGeom prst="rect">
-            <a:avLst/>
-          </a:prstGeom>
-          <a:noFill/>
-        </p:spPr>
-        <p:txBody>
-          <a:bodyPr wrap="square" rtlCol="0">
-            <a:spAutoFit/>
-          </a:bodyPr>
-          <a:lstStyle/>
-          <a:p>
-            <a:r>
-              <a:rPr lang="en-US" dirty="0"/>
-              <a:t>Moran</a:t>
-            </a:r>
-          </a:p>
-        </p:txBody>
-      </p:sp>
-      <p:sp>
-        <p:nvSpPr>
-          <p:cNvPr id="7" name="TextBox 6"/>
-          <p:cNvSpPr txBox="1"/>
-          <p:nvPr/>
-        </p:nvSpPr>
-        <p:spPr>
-          <a:xfrm>
-            <a:off x="5862320" y="1862128"/>
-            <a:ext cx="1513840" cy="369332"/>
-          </a:xfrm>
-          <a:prstGeom prst="rect">
-            <a:avLst/>
-          </a:prstGeom>
-          <a:noFill/>
-        </p:spPr>
-        <p:txBody>
-          <a:bodyPr wrap="square" rtlCol="0">
-            <a:spAutoFit/>
-          </a:bodyPr>
-          <a:lstStyle/>
-          <a:p>
-            <a:r>
-              <a:rPr lang="en-US" dirty="0"/>
-              <a:t>Ruslan</a:t>
-            </a:r>
-          </a:p>
-        </p:txBody>
-      </p:sp>
-      <p:sp>
-        <p:nvSpPr>
-          <p:cNvPr id="8" name="TextBox 7"/>
-          <p:cNvSpPr txBox="1"/>
-          <p:nvPr/>
-        </p:nvSpPr>
-        <p:spPr>
-          <a:xfrm>
-            <a:off x="6862847" y="3672044"/>
-            <a:ext cx="1513840" cy="369332"/>
-          </a:xfrm>
-          <a:prstGeom prst="rect">
-            <a:avLst/>
-          </a:prstGeom>
-          <a:noFill/>
-        </p:spPr>
-        <p:txBody>
-          <a:bodyPr wrap="square" rtlCol="0">
-            <a:spAutoFit/>
-          </a:bodyPr>
-          <a:lstStyle/>
-          <a:p>
-            <a:r>
-              <a:rPr lang="en-US" dirty="0">
+              <a:rPr lang="en-US" sz="8800" dirty="0">
                 <a:solidFill>
-                  <a:schemeClr val="bg1"/>
+                  <a:srgbClr val="92D050"/>
                 </a:solidFill>
               </a:rPr>
-              <a:t>Guy</a:t>
-            </a:r>
-          </a:p>
-        </p:txBody>
-      </p:sp>
-      <p:sp>
-        <p:nvSpPr>
-          <p:cNvPr id="9" name="TextBox 8"/>
-          <p:cNvSpPr txBox="1"/>
-          <p:nvPr/>
-        </p:nvSpPr>
-        <p:spPr>
-          <a:xfrm>
-            <a:off x="3921760" y="4614548"/>
-            <a:ext cx="1513840" cy="369332"/>
-          </a:xfrm>
-          <a:prstGeom prst="rect">
-            <a:avLst/>
-          </a:prstGeom>
-          <a:noFill/>
-        </p:spPr>
-        <p:txBody>
-          <a:bodyPr wrap="square" rtlCol="0">
-            <a:spAutoFit/>
-          </a:bodyPr>
-          <a:lstStyle/>
-          <a:p>
-            <a:r>
-              <a:rPr lang="en-US" dirty="0">
-                <a:solidFill>
-                  <a:schemeClr val="bg1"/>
-                </a:solidFill>
-              </a:rPr>
-              <a:t>Gal</a:t>
-            </a:r>
-          </a:p>
-        </p:txBody>
-      </p:sp>
-      <p:sp>
-        <p:nvSpPr>
-          <p:cNvPr id="10" name="TextBox 9"/>
-          <p:cNvSpPr txBox="1"/>
-          <p:nvPr/>
-        </p:nvSpPr>
-        <p:spPr>
-          <a:xfrm>
-            <a:off x="9530079" y="2442859"/>
-            <a:ext cx="2471667" cy="646331"/>
-          </a:xfrm>
-          <a:prstGeom prst="rect">
-            <a:avLst/>
-          </a:prstGeom>
-          <a:noFill/>
-        </p:spPr>
-        <p:txBody>
-          <a:bodyPr wrap="square" rtlCol="0">
-            <a:spAutoFit/>
-          </a:bodyPr>
-          <a:lstStyle/>
-          <a:p>
-            <a:r>
-              <a:rPr lang="en-US" dirty="0"/>
-              <a:t>Special thanks to</a:t>
-            </a:r>
-          </a:p>
-          <a:p>
-            <a:r>
-              <a:rPr lang="en-US" dirty="0"/>
-              <a:t> </a:t>
+              <a:t>Feasible</a:t>
             </a:r>
           </a:p>
         </p:txBody>
@@ -6184,13 +8716,252 @@
     </p:spTree>
     <p:extLst>
       <p:ext uri="{BB962C8B-B14F-4D97-AF65-F5344CB8AC3E}">
-        <p14:creationId xmlns:p14="http://schemas.microsoft.com/office/powerpoint/2010/main" val="2906367310"/>
+        <p14:creationId xmlns:p14="http://schemas.microsoft.com/office/powerpoint/2010/main" val="2541059985"/>
       </p:ext>
     </p:extLst>
   </p:cSld>
   <p:clrMapOvr>
     <a:masterClrMapping/>
   </p:clrMapOvr>
+  <p:timing>
+    <p:tnLst>
+      <p:par>
+        <p:cTn id="1" dur="indefinite" restart="never" nodeType="tmRoot">
+          <p:childTnLst>
+            <p:seq concurrent="1" nextAc="seek">
+              <p:cTn id="2" dur="indefinite" nodeType="mainSeq">
+                <p:childTnLst>
+                  <p:par>
+                    <p:cTn id="3" fill="hold">
+                      <p:stCondLst>
+                        <p:cond delay="indefinite"/>
+                        <p:cond evt="onBegin" delay="0">
+                          <p:tn val="2"/>
+                        </p:cond>
+                      </p:stCondLst>
+                      <p:childTnLst>
+                        <p:par>
+                          <p:cTn id="4" fill="hold">
+                            <p:stCondLst>
+                              <p:cond delay="0"/>
+                            </p:stCondLst>
+                            <p:childTnLst>
+                              <p:par>
+                                <p:cTn id="5" presetID="10" presetClass="entr" presetSubtype="0" fill="hold" grpId="0" nodeType="afterEffect">
+                                  <p:stCondLst>
+                                    <p:cond delay="0"/>
+                                  </p:stCondLst>
+                                  <p:childTnLst>
+                                    <p:set>
+                                      <p:cBhvr>
+                                        <p:cTn id="6" dur="1" fill="hold">
+                                          <p:stCondLst>
+                                            <p:cond delay="0"/>
+                                          </p:stCondLst>
+                                        </p:cTn>
+                                        <p:tgtEl>
+                                          <p:spTgt spid="4"/>
+                                        </p:tgtEl>
+                                        <p:attrNameLst>
+                                          <p:attrName>style.visibility</p:attrName>
+                                        </p:attrNameLst>
+                                      </p:cBhvr>
+                                      <p:to>
+                                        <p:strVal val="visible"/>
+                                      </p:to>
+                                    </p:set>
+                                    <p:animEffect transition="in" filter="fade">
+                                      <p:cBhvr>
+                                        <p:cTn id="7" dur="500"/>
+                                        <p:tgtEl>
+                                          <p:spTgt spid="4"/>
+                                        </p:tgtEl>
+                                      </p:cBhvr>
+                                    </p:animEffect>
+                                  </p:childTnLst>
+                                </p:cTn>
+                              </p:par>
+                            </p:childTnLst>
+                          </p:cTn>
+                        </p:par>
+                      </p:childTnLst>
+                    </p:cTn>
+                  </p:par>
+                </p:childTnLst>
+              </p:cTn>
+              <p:prevCondLst>
+                <p:cond evt="onPrev" delay="0">
+                  <p:tgtEl>
+                    <p:sldTgt/>
+                  </p:tgtEl>
+                </p:cond>
+              </p:prevCondLst>
+              <p:nextCondLst>
+                <p:cond evt="onNext" delay="0">
+                  <p:tgtEl>
+                    <p:sldTgt/>
+                  </p:tgtEl>
+                </p:cond>
+              </p:nextCondLst>
+            </p:seq>
+          </p:childTnLst>
+        </p:cTn>
+      </p:par>
+    </p:tnLst>
+    <p:bldLst>
+      <p:bldP spid="4" grpId="0"/>
+    </p:bldLst>
+  </p:timing>
+</p:sld>
+</file>
+
+<file path=ppt/slides/slide9.xml><?xml version="1.0" encoding="utf-8"?>
+<p:sld xmlns:a="http://schemas.openxmlformats.org/drawingml/2006/main" xmlns:r="http://schemas.openxmlformats.org/officeDocument/2006/relationships" xmlns:p="http://schemas.openxmlformats.org/presentationml/2006/main">
+  <p:cSld>
+    <p:spTree>
+      <p:nvGrpSpPr>
+        <p:cNvPr id="1" name=""/>
+        <p:cNvGrpSpPr/>
+        <p:nvPr/>
+      </p:nvGrpSpPr>
+      <p:grpSpPr>
+        <a:xfrm>
+          <a:off x="0" y="0"/>
+          <a:ext cx="0" cy="0"/>
+          <a:chOff x="0" y="0"/>
+          <a:chExt cx="0" cy="0"/>
+        </a:xfrm>
+      </p:grpSpPr>
+      <p:sp>
+        <p:nvSpPr>
+          <p:cNvPr id="2" name="Title 1"/>
+          <p:cNvSpPr>
+            <a:spLocks noGrp="1"/>
+          </p:cNvSpPr>
+          <p:nvPr>
+            <p:ph type="title"/>
+          </p:nvPr>
+        </p:nvSpPr>
+        <p:spPr/>
+        <p:txBody>
+          <a:bodyPr/>
+          <a:lstStyle/>
+          <a:p>
+            <a:r>
+              <a:rPr lang="en-US" dirty="0"/>
+              <a:t>Summary</a:t>
+            </a:r>
+            <a:endParaRPr lang="he-IL" dirty="0"/>
+          </a:p>
+        </p:txBody>
+      </p:sp>
+      <p:sp>
+        <p:nvSpPr>
+          <p:cNvPr id="3" name="Content Placeholder 2"/>
+          <p:cNvSpPr>
+            <a:spLocks noGrp="1"/>
+          </p:cNvSpPr>
+          <p:nvPr>
+            <p:ph idx="1"/>
+          </p:nvPr>
+        </p:nvSpPr>
+        <p:spPr/>
+        <p:txBody>
+          <a:bodyPr/>
+          <a:lstStyle/>
+          <a:p>
+            <a:r>
+              <a:rPr lang="en-US" dirty="0"/>
+              <a:t>Computer augmented floor plans</a:t>
+            </a:r>
+          </a:p>
+          <a:p>
+            <a:r>
+              <a:rPr lang="en-US" dirty="0"/>
+              <a:t>Can be generalized to other elements in floor plans </a:t>
+            </a:r>
+          </a:p>
+          <a:p>
+            <a:r>
+              <a:rPr lang="en-US" dirty="0"/>
+              <a:t>Save time to the engineer</a:t>
+            </a:r>
+          </a:p>
+          <a:p>
+            <a:r>
+              <a:rPr lang="en-US" dirty="0"/>
+              <a:t>Prevent human errors</a:t>
+            </a:r>
+          </a:p>
+          <a:p>
+            <a:pPr marL="0" indent="0">
+              <a:buNone/>
+            </a:pPr>
+            <a:endParaRPr lang="en-US" dirty="0"/>
+          </a:p>
+          <a:p>
+            <a:endParaRPr lang="he-IL" dirty="0"/>
+          </a:p>
+        </p:txBody>
+      </p:sp>
+      <p:pic>
+        <p:nvPicPr>
+          <p:cNvPr id="4098" name="Picture 2" descr="Image result for trophy"/>
+          <p:cNvPicPr>
+            <a:picLocks noChangeAspect="1" noChangeArrowheads="1"/>
+          </p:cNvPicPr>
+          <p:nvPr/>
+        </p:nvPicPr>
+        <p:blipFill>
+          <a:blip r:embed="rId2" cstate="print">
+            <a:extLst>
+              <a:ext uri="{28A0092B-C50C-407E-A947-70E740481C1C}">
+                <a14:useLocalDpi xmlns:a14="http://schemas.microsoft.com/office/drawing/2010/main" val="0"/>
+              </a:ext>
+            </a:extLst>
+          </a:blip>
+          <a:srcRect/>
+          <a:stretch>
+            <a:fillRect/>
+          </a:stretch>
+        </p:blipFill>
+        <p:spPr bwMode="auto">
+          <a:xfrm>
+            <a:off x="8756650" y="1329136"/>
+            <a:ext cx="2820000" cy="2724150"/>
+          </a:xfrm>
+          <a:prstGeom prst="rect">
+            <a:avLst/>
+          </a:prstGeom>
+          <a:noFill/>
+          <a:extLst>
+            <a:ext uri="{909E8E84-426E-40DD-AFC4-6F175D3DCCD1}">
+              <a14:hiddenFill xmlns:a14="http://schemas.microsoft.com/office/drawing/2010/main">
+                <a:solidFill>
+                  <a:srgbClr val="FFFFFF"/>
+                </a:solidFill>
+              </a14:hiddenFill>
+            </a:ext>
+          </a:extLst>
+        </p:spPr>
+      </p:pic>
+    </p:spTree>
+    <p:extLst>
+      <p:ext uri="{BB962C8B-B14F-4D97-AF65-F5344CB8AC3E}">
+        <p14:creationId xmlns:p14="http://schemas.microsoft.com/office/powerpoint/2010/main" val="3470922600"/>
+      </p:ext>
+    </p:extLst>
+  </p:cSld>
+  <p:clrMapOvr>
+    <a:masterClrMapping/>
+  </p:clrMapOvr>
+  <p:timing>
+    <p:tnLst>
+      <p:par>
+        <p:cTn id="1" dur="indefinite" restart="never" nodeType="tmRoot"/>
+      </p:par>
+    </p:tnLst>
+  </p:timing>
 </p:sld>
 </file>
 
@@ -6441,7 +9212,7 @@
   <a:extraClrSchemeLst/>
   <a:extLst>
     <a:ext uri="{05A4C25C-085E-4340-85A3-A5531E510DB2}">
-      <thm15:themeFamily xmlns:thm15="http://schemas.microsoft.com/office/thememl/2012/main" name="Gallery" id="{BBFCD31E-59A1-489D-B089-A3EAD7CAE12E}" vid="{F5E91637-A7B6-4E27-B710-77DA7014EE1E}"/>
+      <thm15:themeFamily xmlns:thm15="http://schemas.microsoft.com/office/thememl/2012/main" xmlns="" name="Gallery" id="{BBFCD31E-59A1-489D-B089-A3EAD7CAE12E}" vid="{F5E91637-A7B6-4E27-B710-77DA7014EE1E}"/>
     </a:ext>
   </a:extLst>
 </a:theme>
@@ -6736,7 +9507,7 @@
   <a:extraClrSchemeLst/>
   <a:extLst>
     <a:ext uri="{05A4C25C-085E-4340-85A3-A5531E510DB2}">
-      <thm15:themeFamily xmlns:thm15="http://schemas.microsoft.com/office/thememl/2012/main" name="Office Theme" id="{62F939B6-93AF-4DB8-9C6B-D6C7DFDC589F}" vid="{4A3C46E8-61CC-4603-A589-7422A47A8E4A}"/>
+      <thm15:themeFamily xmlns:thm15="http://schemas.microsoft.com/office/thememl/2012/main" xmlns="" name="Office Theme" id="{62F939B6-93AF-4DB8-9C6B-D6C7DFDC589F}" vid="{4A3C46E8-61CC-4603-A589-7422A47A8E4A}"/>
     </a:ext>
   </a:extLst>
 </a:theme>

</xml_diff>